<commit_message>
modified:   Organisational/Dokumentation HHZ Rocket Project.pptx 	modified:   notebook/finalized_model.pkl
</commit_message>
<xml_diff>
--- a/Organisational/Dokumentation HHZ Rocket Project.pptx
+++ b/Organisational/Dokumentation HHZ Rocket Project.pptx
@@ -5,35 +5,34 @@
     <p:sldMasterId id="2147483648" r:id="rId1"/>
   </p:sldMasterIdLst>
   <p:notesMasterIdLst>
-    <p:notesMasterId r:id="rId28"/>
+    <p:notesMasterId r:id="rId27"/>
   </p:notesMasterIdLst>
   <p:sldIdLst>
     <p:sldId id="256" r:id="rId2"/>
     <p:sldId id="257" r:id="rId3"/>
     <p:sldId id="269" r:id="rId4"/>
     <p:sldId id="259" r:id="rId5"/>
-    <p:sldId id="276" r:id="rId6"/>
-    <p:sldId id="260" r:id="rId7"/>
-    <p:sldId id="261" r:id="rId8"/>
-    <p:sldId id="262" r:id="rId9"/>
-    <p:sldId id="275" r:id="rId10"/>
-    <p:sldId id="270" r:id="rId11"/>
-    <p:sldId id="264" r:id="rId12"/>
-    <p:sldId id="271" r:id="rId13"/>
-    <p:sldId id="268" r:id="rId14"/>
-    <p:sldId id="273" r:id="rId15"/>
-    <p:sldId id="277" r:id="rId16"/>
-    <p:sldId id="274" r:id="rId17"/>
-    <p:sldId id="279" r:id="rId18"/>
-    <p:sldId id="280" r:id="rId19"/>
-    <p:sldId id="285" r:id="rId20"/>
-    <p:sldId id="278" r:id="rId21"/>
-    <p:sldId id="281" r:id="rId22"/>
-    <p:sldId id="282" r:id="rId23"/>
-    <p:sldId id="283" r:id="rId24"/>
-    <p:sldId id="286" r:id="rId25"/>
-    <p:sldId id="287" r:id="rId26"/>
-    <p:sldId id="288" r:id="rId27"/>
+    <p:sldId id="260" r:id="rId6"/>
+    <p:sldId id="261" r:id="rId7"/>
+    <p:sldId id="262" r:id="rId8"/>
+    <p:sldId id="275" r:id="rId9"/>
+    <p:sldId id="270" r:id="rId10"/>
+    <p:sldId id="264" r:id="rId11"/>
+    <p:sldId id="271" r:id="rId12"/>
+    <p:sldId id="268" r:id="rId13"/>
+    <p:sldId id="273" r:id="rId14"/>
+    <p:sldId id="277" r:id="rId15"/>
+    <p:sldId id="274" r:id="rId16"/>
+    <p:sldId id="279" r:id="rId17"/>
+    <p:sldId id="280" r:id="rId18"/>
+    <p:sldId id="285" r:id="rId19"/>
+    <p:sldId id="278" r:id="rId20"/>
+    <p:sldId id="281" r:id="rId21"/>
+    <p:sldId id="282" r:id="rId22"/>
+    <p:sldId id="283" r:id="rId23"/>
+    <p:sldId id="286" r:id="rId24"/>
+    <p:sldId id="287" r:id="rId25"/>
+    <p:sldId id="288" r:id="rId26"/>
   </p:sldIdLst>
   <p:sldSz cx="12192000" cy="6858000"/>
   <p:notesSz cx="6858000" cy="9144000"/>
@@ -1959,1052 +1958,7 @@
 </dgm:colorsDef>
 </file>
 
-<file path=ppt/diagrams/colors3.xml><?xml version="1.0" encoding="utf-8"?>
-<dgm:colorsDef xmlns:dgm="http://schemas.openxmlformats.org/drawingml/2006/diagram" xmlns:a="http://schemas.openxmlformats.org/drawingml/2006/main" uniqueId="urn:microsoft.com/office/officeart/2005/8/colors/accent1_2">
-  <dgm:title val=""/>
-  <dgm:desc val=""/>
-  <dgm:catLst>
-    <dgm:cat type="accent1" pri="11200"/>
-  </dgm:catLst>
-  <dgm:styleLbl name="node0">
-    <dgm:fillClrLst meth="repeat">
-      <a:schemeClr val="accent1"/>
-    </dgm:fillClrLst>
-    <dgm:linClrLst meth="repeat">
-      <a:schemeClr val="lt1"/>
-    </dgm:linClrLst>
-    <dgm:effectClrLst/>
-    <dgm:txLinClrLst/>
-    <dgm:txFillClrLst/>
-    <dgm:txEffectClrLst/>
-  </dgm:styleLbl>
-  <dgm:styleLbl name="alignNode1">
-    <dgm:fillClrLst meth="repeat">
-      <a:schemeClr val="accent1"/>
-    </dgm:fillClrLst>
-    <dgm:linClrLst meth="repeat">
-      <a:schemeClr val="accent1"/>
-    </dgm:linClrLst>
-    <dgm:effectClrLst/>
-    <dgm:txLinClrLst/>
-    <dgm:txFillClrLst/>
-    <dgm:txEffectClrLst/>
-  </dgm:styleLbl>
-  <dgm:styleLbl name="node1">
-    <dgm:fillClrLst meth="repeat">
-      <a:schemeClr val="accent1"/>
-    </dgm:fillClrLst>
-    <dgm:linClrLst meth="repeat">
-      <a:schemeClr val="lt1"/>
-    </dgm:linClrLst>
-    <dgm:effectClrLst/>
-    <dgm:txLinClrLst/>
-    <dgm:txFillClrLst/>
-    <dgm:txEffectClrLst/>
-  </dgm:styleLbl>
-  <dgm:styleLbl name="lnNode1">
-    <dgm:fillClrLst meth="repeat">
-      <a:schemeClr val="accent1"/>
-    </dgm:fillClrLst>
-    <dgm:linClrLst meth="repeat">
-      <a:schemeClr val="lt1"/>
-    </dgm:linClrLst>
-    <dgm:effectClrLst/>
-    <dgm:txLinClrLst/>
-    <dgm:txFillClrLst/>
-    <dgm:txEffectClrLst/>
-  </dgm:styleLbl>
-  <dgm:styleLbl name="vennNode1">
-    <dgm:fillClrLst meth="repeat">
-      <a:schemeClr val="accent1">
-        <a:alpha val="50000"/>
-      </a:schemeClr>
-    </dgm:fillClrLst>
-    <dgm:linClrLst meth="repeat">
-      <a:schemeClr val="lt1"/>
-    </dgm:linClrLst>
-    <dgm:effectClrLst/>
-    <dgm:txLinClrLst/>
-    <dgm:txFillClrLst/>
-    <dgm:txEffectClrLst/>
-  </dgm:styleLbl>
-  <dgm:styleLbl name="node2">
-    <dgm:fillClrLst meth="repeat">
-      <a:schemeClr val="accent1"/>
-    </dgm:fillClrLst>
-    <dgm:linClrLst meth="repeat">
-      <a:schemeClr val="lt1"/>
-    </dgm:linClrLst>
-    <dgm:effectClrLst/>
-    <dgm:txLinClrLst/>
-    <dgm:txFillClrLst/>
-    <dgm:txEffectClrLst/>
-  </dgm:styleLbl>
-  <dgm:styleLbl name="node3">
-    <dgm:fillClrLst meth="repeat">
-      <a:schemeClr val="accent1"/>
-    </dgm:fillClrLst>
-    <dgm:linClrLst meth="repeat">
-      <a:schemeClr val="lt1"/>
-    </dgm:linClrLst>
-    <dgm:effectClrLst/>
-    <dgm:txLinClrLst/>
-    <dgm:txFillClrLst/>
-    <dgm:txEffectClrLst/>
-  </dgm:styleLbl>
-  <dgm:styleLbl name="node4">
-    <dgm:fillClrLst meth="repeat">
-      <a:schemeClr val="accent1"/>
-    </dgm:fillClrLst>
-    <dgm:linClrLst meth="repeat">
-      <a:schemeClr val="lt1"/>
-    </dgm:linClrLst>
-    <dgm:effectClrLst/>
-    <dgm:txLinClrLst/>
-    <dgm:txFillClrLst/>
-    <dgm:txEffectClrLst/>
-  </dgm:styleLbl>
-  <dgm:styleLbl name="fgImgPlace1">
-    <dgm:fillClrLst meth="repeat">
-      <a:schemeClr val="accent1">
-        <a:tint val="50000"/>
-      </a:schemeClr>
-    </dgm:fillClrLst>
-    <dgm:linClrLst meth="repeat">
-      <a:schemeClr val="lt1"/>
-    </dgm:linClrLst>
-    <dgm:effectClrLst/>
-    <dgm:txLinClrLst/>
-    <dgm:txFillClrLst meth="repeat">
-      <a:schemeClr val="lt1"/>
-    </dgm:txFillClrLst>
-    <dgm:txEffectClrLst/>
-  </dgm:styleLbl>
-  <dgm:styleLbl name="alignImgPlace1">
-    <dgm:fillClrLst meth="repeat">
-      <a:schemeClr val="accent1">
-        <a:tint val="50000"/>
-      </a:schemeClr>
-    </dgm:fillClrLst>
-    <dgm:linClrLst meth="repeat">
-      <a:schemeClr val="lt1"/>
-    </dgm:linClrLst>
-    <dgm:effectClrLst/>
-    <dgm:txLinClrLst/>
-    <dgm:txFillClrLst meth="repeat">
-      <a:schemeClr val="lt1"/>
-    </dgm:txFillClrLst>
-    <dgm:txEffectClrLst/>
-  </dgm:styleLbl>
-  <dgm:styleLbl name="bgImgPlace1">
-    <dgm:fillClrLst meth="repeat">
-      <a:schemeClr val="accent1">
-        <a:tint val="50000"/>
-      </a:schemeClr>
-    </dgm:fillClrLst>
-    <dgm:linClrLst meth="repeat">
-      <a:schemeClr val="lt1"/>
-    </dgm:linClrLst>
-    <dgm:effectClrLst/>
-    <dgm:txLinClrLst/>
-    <dgm:txFillClrLst meth="repeat">
-      <a:schemeClr val="lt1"/>
-    </dgm:txFillClrLst>
-    <dgm:txEffectClrLst/>
-  </dgm:styleLbl>
-  <dgm:styleLbl name="sibTrans2D1">
-    <dgm:fillClrLst meth="repeat">
-      <a:schemeClr val="accent1">
-        <a:tint val="60000"/>
-      </a:schemeClr>
-    </dgm:fillClrLst>
-    <dgm:linClrLst meth="repeat">
-      <a:schemeClr val="accent1">
-        <a:tint val="60000"/>
-      </a:schemeClr>
-    </dgm:linClrLst>
-    <dgm:effectClrLst/>
-    <dgm:txLinClrLst/>
-    <dgm:txFillClrLst/>
-    <dgm:txEffectClrLst/>
-  </dgm:styleLbl>
-  <dgm:styleLbl name="fgSibTrans2D1">
-    <dgm:fillClrLst meth="repeat">
-      <a:schemeClr val="accent1">
-        <a:tint val="60000"/>
-      </a:schemeClr>
-    </dgm:fillClrLst>
-    <dgm:linClrLst meth="repeat">
-      <a:schemeClr val="accent1">
-        <a:tint val="60000"/>
-      </a:schemeClr>
-    </dgm:linClrLst>
-    <dgm:effectClrLst/>
-    <dgm:txLinClrLst/>
-    <dgm:txFillClrLst/>
-    <dgm:txEffectClrLst/>
-  </dgm:styleLbl>
-  <dgm:styleLbl name="bgSibTrans2D1">
-    <dgm:fillClrLst meth="repeat">
-      <a:schemeClr val="accent1">
-        <a:tint val="60000"/>
-      </a:schemeClr>
-    </dgm:fillClrLst>
-    <dgm:linClrLst meth="repeat">
-      <a:schemeClr val="accent1">
-        <a:tint val="60000"/>
-      </a:schemeClr>
-    </dgm:linClrLst>
-    <dgm:effectClrLst/>
-    <dgm:txLinClrLst/>
-    <dgm:txFillClrLst/>
-    <dgm:txEffectClrLst/>
-  </dgm:styleLbl>
-  <dgm:styleLbl name="sibTrans1D1">
-    <dgm:fillClrLst meth="repeat">
-      <a:schemeClr val="accent1"/>
-    </dgm:fillClrLst>
-    <dgm:linClrLst meth="repeat">
-      <a:schemeClr val="accent1"/>
-    </dgm:linClrLst>
-    <dgm:effectClrLst/>
-    <dgm:txLinClrLst/>
-    <dgm:txFillClrLst meth="repeat">
-      <a:schemeClr val="tx1"/>
-    </dgm:txFillClrLst>
-    <dgm:txEffectClrLst/>
-  </dgm:styleLbl>
-  <dgm:styleLbl name="callout">
-    <dgm:fillClrLst meth="repeat">
-      <a:schemeClr val="accent1"/>
-    </dgm:fillClrLst>
-    <dgm:linClrLst meth="repeat">
-      <a:schemeClr val="accent1">
-        <a:tint val="50000"/>
-      </a:schemeClr>
-    </dgm:linClrLst>
-    <dgm:effectClrLst/>
-    <dgm:txLinClrLst/>
-    <dgm:txFillClrLst meth="repeat">
-      <a:schemeClr val="tx1"/>
-    </dgm:txFillClrLst>
-    <dgm:txEffectClrLst/>
-  </dgm:styleLbl>
-  <dgm:styleLbl name="asst0">
-    <dgm:fillClrLst meth="repeat">
-      <a:schemeClr val="accent1"/>
-    </dgm:fillClrLst>
-    <dgm:linClrLst meth="repeat">
-      <a:schemeClr val="lt1"/>
-    </dgm:linClrLst>
-    <dgm:effectClrLst/>
-    <dgm:txLinClrLst/>
-    <dgm:txFillClrLst/>
-    <dgm:txEffectClrLst/>
-  </dgm:styleLbl>
-  <dgm:styleLbl name="asst1">
-    <dgm:fillClrLst meth="repeat">
-      <a:schemeClr val="accent1"/>
-    </dgm:fillClrLst>
-    <dgm:linClrLst meth="repeat">
-      <a:schemeClr val="lt1"/>
-    </dgm:linClrLst>
-    <dgm:effectClrLst/>
-    <dgm:txLinClrLst/>
-    <dgm:txFillClrLst/>
-    <dgm:txEffectClrLst/>
-  </dgm:styleLbl>
-  <dgm:styleLbl name="asst2">
-    <dgm:fillClrLst meth="repeat">
-      <a:schemeClr val="accent1"/>
-    </dgm:fillClrLst>
-    <dgm:linClrLst meth="repeat">
-      <a:schemeClr val="lt1"/>
-    </dgm:linClrLst>
-    <dgm:effectClrLst/>
-    <dgm:txLinClrLst/>
-    <dgm:txFillClrLst/>
-    <dgm:txEffectClrLst/>
-  </dgm:styleLbl>
-  <dgm:styleLbl name="asst3">
-    <dgm:fillClrLst meth="repeat">
-      <a:schemeClr val="accent1"/>
-    </dgm:fillClrLst>
-    <dgm:linClrLst meth="repeat">
-      <a:schemeClr val="lt1"/>
-    </dgm:linClrLst>
-    <dgm:effectClrLst/>
-    <dgm:txLinClrLst/>
-    <dgm:txFillClrLst/>
-    <dgm:txEffectClrLst/>
-  </dgm:styleLbl>
-  <dgm:styleLbl name="asst4">
-    <dgm:fillClrLst meth="repeat">
-      <a:schemeClr val="accent1"/>
-    </dgm:fillClrLst>
-    <dgm:linClrLst meth="repeat">
-      <a:schemeClr val="lt1"/>
-    </dgm:linClrLst>
-    <dgm:effectClrLst/>
-    <dgm:txLinClrLst/>
-    <dgm:txFillClrLst/>
-    <dgm:txEffectClrLst/>
-  </dgm:styleLbl>
-  <dgm:styleLbl name="parChTrans2D1">
-    <dgm:fillClrLst meth="repeat">
-      <a:schemeClr val="accent1">
-        <a:tint val="60000"/>
-      </a:schemeClr>
-    </dgm:fillClrLst>
-    <dgm:linClrLst meth="repeat">
-      <a:schemeClr val="accent1">
-        <a:tint val="60000"/>
-      </a:schemeClr>
-    </dgm:linClrLst>
-    <dgm:effectClrLst/>
-    <dgm:txLinClrLst/>
-    <dgm:txFillClrLst meth="repeat">
-      <a:schemeClr val="lt1"/>
-    </dgm:txFillClrLst>
-    <dgm:txEffectClrLst/>
-  </dgm:styleLbl>
-  <dgm:styleLbl name="parChTrans2D2">
-    <dgm:fillClrLst meth="repeat">
-      <a:schemeClr val="accent1"/>
-    </dgm:fillClrLst>
-    <dgm:linClrLst meth="repeat">
-      <a:schemeClr val="accent1"/>
-    </dgm:linClrLst>
-    <dgm:effectClrLst/>
-    <dgm:txLinClrLst/>
-    <dgm:txFillClrLst meth="repeat">
-      <a:schemeClr val="lt1"/>
-    </dgm:txFillClrLst>
-    <dgm:txEffectClrLst/>
-  </dgm:styleLbl>
-  <dgm:styleLbl name="parChTrans2D3">
-    <dgm:fillClrLst meth="repeat">
-      <a:schemeClr val="accent1"/>
-    </dgm:fillClrLst>
-    <dgm:linClrLst meth="repeat">
-      <a:schemeClr val="accent1"/>
-    </dgm:linClrLst>
-    <dgm:effectClrLst/>
-    <dgm:txLinClrLst/>
-    <dgm:txFillClrLst meth="repeat">
-      <a:schemeClr val="lt1"/>
-    </dgm:txFillClrLst>
-    <dgm:txEffectClrLst/>
-  </dgm:styleLbl>
-  <dgm:styleLbl name="parChTrans2D4">
-    <dgm:fillClrLst meth="repeat">
-      <a:schemeClr val="accent1"/>
-    </dgm:fillClrLst>
-    <dgm:linClrLst meth="repeat">
-      <a:schemeClr val="accent1"/>
-    </dgm:linClrLst>
-    <dgm:effectClrLst/>
-    <dgm:txLinClrLst/>
-    <dgm:txFillClrLst meth="repeat">
-      <a:schemeClr val="lt1"/>
-    </dgm:txFillClrLst>
-    <dgm:txEffectClrLst/>
-  </dgm:styleLbl>
-  <dgm:styleLbl name="parChTrans1D1">
-    <dgm:fillClrLst meth="repeat">
-      <a:schemeClr val="accent1"/>
-    </dgm:fillClrLst>
-    <dgm:linClrLst meth="repeat">
-      <a:schemeClr val="accent1">
-        <a:shade val="60000"/>
-      </a:schemeClr>
-    </dgm:linClrLst>
-    <dgm:effectClrLst/>
-    <dgm:txLinClrLst/>
-    <dgm:txFillClrLst meth="repeat">
-      <a:schemeClr val="tx1"/>
-    </dgm:txFillClrLst>
-    <dgm:txEffectClrLst/>
-  </dgm:styleLbl>
-  <dgm:styleLbl name="parChTrans1D2">
-    <dgm:fillClrLst meth="repeat">
-      <a:schemeClr val="accent1"/>
-    </dgm:fillClrLst>
-    <dgm:linClrLst meth="repeat">
-      <a:schemeClr val="accent1">
-        <a:shade val="60000"/>
-      </a:schemeClr>
-    </dgm:linClrLst>
-    <dgm:effectClrLst/>
-    <dgm:txLinClrLst/>
-    <dgm:txFillClrLst meth="repeat">
-      <a:schemeClr val="tx1"/>
-    </dgm:txFillClrLst>
-    <dgm:txEffectClrLst/>
-  </dgm:styleLbl>
-  <dgm:styleLbl name="parChTrans1D3">
-    <dgm:fillClrLst meth="repeat">
-      <a:schemeClr val="accent1"/>
-    </dgm:fillClrLst>
-    <dgm:linClrLst meth="repeat">
-      <a:schemeClr val="accent1">
-        <a:shade val="80000"/>
-      </a:schemeClr>
-    </dgm:linClrLst>
-    <dgm:effectClrLst/>
-    <dgm:txLinClrLst/>
-    <dgm:txFillClrLst meth="repeat">
-      <a:schemeClr val="tx1"/>
-    </dgm:txFillClrLst>
-    <dgm:txEffectClrLst/>
-  </dgm:styleLbl>
-  <dgm:styleLbl name="parChTrans1D4">
-    <dgm:fillClrLst meth="repeat">
-      <a:schemeClr val="accent1"/>
-    </dgm:fillClrLst>
-    <dgm:linClrLst meth="repeat">
-      <a:schemeClr val="accent1">
-        <a:shade val="80000"/>
-      </a:schemeClr>
-    </dgm:linClrLst>
-    <dgm:effectClrLst/>
-    <dgm:txLinClrLst/>
-    <dgm:txFillClrLst meth="repeat">
-      <a:schemeClr val="tx1"/>
-    </dgm:txFillClrLst>
-    <dgm:txEffectClrLst/>
-  </dgm:styleLbl>
-  <dgm:styleLbl name="fgAcc1">
-    <dgm:fillClrLst meth="repeat">
-      <a:schemeClr val="lt1">
-        <a:alpha val="90000"/>
-      </a:schemeClr>
-    </dgm:fillClrLst>
-    <dgm:linClrLst meth="repeat">
-      <a:schemeClr val="accent1"/>
-    </dgm:linClrLst>
-    <dgm:effectClrLst/>
-    <dgm:txLinClrLst/>
-    <dgm:txFillClrLst meth="repeat">
-      <a:schemeClr val="dk1"/>
-    </dgm:txFillClrLst>
-    <dgm:txEffectClrLst/>
-  </dgm:styleLbl>
-  <dgm:styleLbl name="conFgAcc1">
-    <dgm:fillClrLst meth="repeat">
-      <a:schemeClr val="lt1">
-        <a:alpha val="90000"/>
-      </a:schemeClr>
-    </dgm:fillClrLst>
-    <dgm:linClrLst meth="repeat">
-      <a:schemeClr val="accent1"/>
-    </dgm:linClrLst>
-    <dgm:effectClrLst/>
-    <dgm:txLinClrLst/>
-    <dgm:txFillClrLst meth="repeat">
-      <a:schemeClr val="dk1"/>
-    </dgm:txFillClrLst>
-    <dgm:txEffectClrLst/>
-  </dgm:styleLbl>
-  <dgm:styleLbl name="alignAcc1">
-    <dgm:fillClrLst meth="repeat">
-      <a:schemeClr val="lt1">
-        <a:alpha val="90000"/>
-      </a:schemeClr>
-    </dgm:fillClrLst>
-    <dgm:linClrLst meth="repeat">
-      <a:schemeClr val="accent1"/>
-    </dgm:linClrLst>
-    <dgm:effectClrLst/>
-    <dgm:txLinClrLst/>
-    <dgm:txFillClrLst meth="repeat">
-      <a:schemeClr val="dk1"/>
-    </dgm:txFillClrLst>
-    <dgm:txEffectClrLst/>
-  </dgm:styleLbl>
-  <dgm:styleLbl name="trAlignAcc1">
-    <dgm:fillClrLst meth="repeat">
-      <a:schemeClr val="lt1">
-        <a:alpha val="40000"/>
-      </a:schemeClr>
-    </dgm:fillClrLst>
-    <dgm:linClrLst meth="repeat">
-      <a:schemeClr val="accent1"/>
-    </dgm:linClrLst>
-    <dgm:effectClrLst/>
-    <dgm:txLinClrLst/>
-    <dgm:txFillClrLst meth="repeat">
-      <a:schemeClr val="dk1"/>
-    </dgm:txFillClrLst>
-    <dgm:txEffectClrLst/>
-  </dgm:styleLbl>
-  <dgm:styleLbl name="bgAcc1">
-    <dgm:fillClrLst meth="repeat">
-      <a:schemeClr val="lt1">
-        <a:alpha val="90000"/>
-      </a:schemeClr>
-    </dgm:fillClrLst>
-    <dgm:linClrLst meth="repeat">
-      <a:schemeClr val="accent1"/>
-    </dgm:linClrLst>
-    <dgm:effectClrLst/>
-    <dgm:txLinClrLst/>
-    <dgm:txFillClrLst meth="repeat">
-      <a:schemeClr val="dk1"/>
-    </dgm:txFillClrLst>
-    <dgm:txEffectClrLst/>
-  </dgm:styleLbl>
-  <dgm:styleLbl name="solidFgAcc1">
-    <dgm:fillClrLst meth="repeat">
-      <a:schemeClr val="lt1"/>
-    </dgm:fillClrLst>
-    <dgm:linClrLst meth="repeat">
-      <a:schemeClr val="accent1"/>
-    </dgm:linClrLst>
-    <dgm:effectClrLst/>
-    <dgm:txLinClrLst/>
-    <dgm:txFillClrLst meth="repeat">
-      <a:schemeClr val="dk1"/>
-    </dgm:txFillClrLst>
-    <dgm:txEffectClrLst/>
-  </dgm:styleLbl>
-  <dgm:styleLbl name="solidAlignAcc1">
-    <dgm:fillClrLst meth="repeat">
-      <a:schemeClr val="lt1"/>
-    </dgm:fillClrLst>
-    <dgm:linClrLst meth="repeat">
-      <a:schemeClr val="accent1"/>
-    </dgm:linClrLst>
-    <dgm:effectClrLst/>
-    <dgm:txLinClrLst/>
-    <dgm:txFillClrLst meth="repeat">
-      <a:schemeClr val="dk1"/>
-    </dgm:txFillClrLst>
-    <dgm:txEffectClrLst/>
-  </dgm:styleLbl>
-  <dgm:styleLbl name="solidBgAcc1">
-    <dgm:fillClrLst meth="repeat">
-      <a:schemeClr val="lt1"/>
-    </dgm:fillClrLst>
-    <dgm:linClrLst meth="repeat">
-      <a:schemeClr val="accent1"/>
-    </dgm:linClrLst>
-    <dgm:effectClrLst/>
-    <dgm:txLinClrLst/>
-    <dgm:txFillClrLst meth="repeat">
-      <a:schemeClr val="dk1"/>
-    </dgm:txFillClrLst>
-    <dgm:txEffectClrLst/>
-  </dgm:styleLbl>
-  <dgm:styleLbl name="fgAccFollowNode1">
-    <dgm:fillClrLst meth="repeat">
-      <a:schemeClr val="accent1">
-        <a:alpha val="90000"/>
-        <a:tint val="40000"/>
-      </a:schemeClr>
-    </dgm:fillClrLst>
-    <dgm:linClrLst meth="repeat">
-      <a:schemeClr val="accent1">
-        <a:alpha val="90000"/>
-        <a:tint val="40000"/>
-      </a:schemeClr>
-    </dgm:linClrLst>
-    <dgm:effectClrLst/>
-    <dgm:txLinClrLst/>
-    <dgm:txFillClrLst meth="repeat">
-      <a:schemeClr val="dk1"/>
-    </dgm:txFillClrLst>
-    <dgm:txEffectClrLst/>
-  </dgm:styleLbl>
-  <dgm:styleLbl name="alignAccFollowNode1">
-    <dgm:fillClrLst meth="repeat">
-      <a:schemeClr val="accent1">
-        <a:alpha val="90000"/>
-        <a:tint val="40000"/>
-      </a:schemeClr>
-    </dgm:fillClrLst>
-    <dgm:linClrLst meth="repeat">
-      <a:schemeClr val="accent1">
-        <a:alpha val="90000"/>
-        <a:tint val="40000"/>
-      </a:schemeClr>
-    </dgm:linClrLst>
-    <dgm:effectClrLst/>
-    <dgm:txLinClrLst/>
-    <dgm:txFillClrLst meth="repeat">
-      <a:schemeClr val="dk1"/>
-    </dgm:txFillClrLst>
-    <dgm:txEffectClrLst/>
-  </dgm:styleLbl>
-  <dgm:styleLbl name="bgAccFollowNode1">
-    <dgm:fillClrLst meth="repeat">
-      <a:schemeClr val="accent1">
-        <a:alpha val="90000"/>
-        <a:tint val="40000"/>
-      </a:schemeClr>
-    </dgm:fillClrLst>
-    <dgm:linClrLst meth="repeat">
-      <a:schemeClr val="accent1">
-        <a:alpha val="90000"/>
-        <a:tint val="40000"/>
-      </a:schemeClr>
-    </dgm:linClrLst>
-    <dgm:effectClrLst/>
-    <dgm:txLinClrLst/>
-    <dgm:txFillClrLst meth="repeat">
-      <a:schemeClr val="dk1"/>
-    </dgm:txFillClrLst>
-    <dgm:txEffectClrLst/>
-  </dgm:styleLbl>
-  <dgm:styleLbl name="fgAcc0">
-    <dgm:fillClrLst meth="repeat">
-      <a:schemeClr val="lt1">
-        <a:alpha val="90000"/>
-      </a:schemeClr>
-    </dgm:fillClrLst>
-    <dgm:linClrLst meth="repeat">
-      <a:schemeClr val="accent1"/>
-    </dgm:linClrLst>
-    <dgm:effectClrLst/>
-    <dgm:txLinClrLst/>
-    <dgm:txFillClrLst meth="repeat">
-      <a:schemeClr val="dk1"/>
-    </dgm:txFillClrLst>
-    <dgm:txEffectClrLst/>
-  </dgm:styleLbl>
-  <dgm:styleLbl name="fgAcc2">
-    <dgm:fillClrLst meth="repeat">
-      <a:schemeClr val="lt1">
-        <a:alpha val="90000"/>
-      </a:schemeClr>
-    </dgm:fillClrLst>
-    <dgm:linClrLst meth="repeat">
-      <a:schemeClr val="accent1"/>
-    </dgm:linClrLst>
-    <dgm:effectClrLst/>
-    <dgm:txLinClrLst/>
-    <dgm:txFillClrLst meth="repeat">
-      <a:schemeClr val="dk1"/>
-    </dgm:txFillClrLst>
-    <dgm:txEffectClrLst/>
-  </dgm:styleLbl>
-  <dgm:styleLbl name="fgAcc3">
-    <dgm:fillClrLst meth="repeat">
-      <a:schemeClr val="lt1">
-        <a:alpha val="90000"/>
-      </a:schemeClr>
-    </dgm:fillClrLst>
-    <dgm:linClrLst meth="repeat">
-      <a:schemeClr val="accent1"/>
-    </dgm:linClrLst>
-    <dgm:effectClrLst/>
-    <dgm:txLinClrLst/>
-    <dgm:txFillClrLst meth="repeat">
-      <a:schemeClr val="dk1"/>
-    </dgm:txFillClrLst>
-    <dgm:txEffectClrLst/>
-  </dgm:styleLbl>
-  <dgm:styleLbl name="fgAcc4">
-    <dgm:fillClrLst meth="repeat">
-      <a:schemeClr val="lt1">
-        <a:alpha val="90000"/>
-      </a:schemeClr>
-    </dgm:fillClrLst>
-    <dgm:linClrLst meth="repeat">
-      <a:schemeClr val="accent1"/>
-    </dgm:linClrLst>
-    <dgm:effectClrLst/>
-    <dgm:txLinClrLst/>
-    <dgm:txFillClrLst meth="repeat">
-      <a:schemeClr val="dk1"/>
-    </dgm:txFillClrLst>
-    <dgm:txEffectClrLst/>
-  </dgm:styleLbl>
-  <dgm:styleLbl name="bgShp">
-    <dgm:fillClrLst meth="repeat">
-      <a:schemeClr val="accent1">
-        <a:tint val="40000"/>
-      </a:schemeClr>
-    </dgm:fillClrLst>
-    <dgm:linClrLst meth="repeat">
-      <a:schemeClr val="accent1"/>
-    </dgm:linClrLst>
-    <dgm:effectClrLst/>
-    <dgm:txLinClrLst/>
-    <dgm:txFillClrLst meth="repeat">
-      <a:schemeClr val="dk1"/>
-    </dgm:txFillClrLst>
-    <dgm:txEffectClrLst/>
-  </dgm:styleLbl>
-  <dgm:styleLbl name="dkBgShp">
-    <dgm:fillClrLst meth="repeat">
-      <a:schemeClr val="accent1">
-        <a:shade val="80000"/>
-      </a:schemeClr>
-    </dgm:fillClrLst>
-    <dgm:linClrLst meth="repeat">
-      <a:schemeClr val="accent1"/>
-    </dgm:linClrLst>
-    <dgm:effectClrLst/>
-    <dgm:txLinClrLst/>
-    <dgm:txFillClrLst meth="repeat">
-      <a:schemeClr val="lt1"/>
-    </dgm:txFillClrLst>
-    <dgm:txEffectClrLst/>
-  </dgm:styleLbl>
-  <dgm:styleLbl name="trBgShp">
-    <dgm:fillClrLst meth="repeat">
-      <a:schemeClr val="accent1">
-        <a:tint val="50000"/>
-        <a:alpha val="40000"/>
-      </a:schemeClr>
-    </dgm:fillClrLst>
-    <dgm:linClrLst meth="repeat">
-      <a:schemeClr val="accent1"/>
-    </dgm:linClrLst>
-    <dgm:effectClrLst/>
-    <dgm:txLinClrLst/>
-    <dgm:txFillClrLst meth="repeat">
-      <a:schemeClr val="lt1"/>
-    </dgm:txFillClrLst>
-    <dgm:txEffectClrLst/>
-  </dgm:styleLbl>
-  <dgm:styleLbl name="fgShp">
-    <dgm:fillClrLst meth="repeat">
-      <a:schemeClr val="accent1">
-        <a:tint val="60000"/>
-      </a:schemeClr>
-    </dgm:fillClrLst>
-    <dgm:linClrLst meth="repeat">
-      <a:schemeClr val="lt1"/>
-    </dgm:linClrLst>
-    <dgm:effectClrLst/>
-    <dgm:txLinClrLst/>
-    <dgm:txFillClrLst meth="repeat">
-      <a:schemeClr val="dk1"/>
-    </dgm:txFillClrLst>
-    <dgm:txEffectClrLst/>
-  </dgm:styleLbl>
-  <dgm:styleLbl name="revTx">
-    <dgm:fillClrLst meth="repeat">
-      <a:schemeClr val="lt1">
-        <a:alpha val="0"/>
-      </a:schemeClr>
-    </dgm:fillClrLst>
-    <dgm:linClrLst meth="repeat">
-      <a:schemeClr val="dk1">
-        <a:alpha val="0"/>
-      </a:schemeClr>
-    </dgm:linClrLst>
-    <dgm:effectClrLst/>
-    <dgm:txLinClrLst/>
-    <dgm:txFillClrLst meth="repeat">
-      <a:schemeClr val="tx1"/>
-    </dgm:txFillClrLst>
-    <dgm:txEffectClrLst/>
-  </dgm:styleLbl>
-</dgm:colorsDef>
-</file>
-
 <file path=ppt/diagrams/data1.xml><?xml version="1.0" encoding="utf-8"?>
-<dgm:dataModel xmlns:dgm="http://schemas.openxmlformats.org/drawingml/2006/diagram" xmlns:a="http://schemas.openxmlformats.org/drawingml/2006/main">
-  <dgm:ptLst>
-    <dgm:pt modelId="{32B5D352-1E80-4ADC-8F34-2C7161DD8167}" type="doc">
-      <dgm:prSet loTypeId="urn:microsoft.com/office/officeart/2008/layout/LinedList" loCatId="list" qsTypeId="urn:microsoft.com/office/officeart/2005/8/quickstyle/simple1" qsCatId="simple" csTypeId="urn:microsoft.com/office/officeart/2005/8/colors/accent1_2" csCatId="accent1" phldr="1"/>
-      <dgm:spPr/>
-      <dgm:t>
-        <a:bodyPr/>
-        <a:lstStyle/>
-        <a:p>
-          <a:endParaRPr lang="en-US"/>
-        </a:p>
-      </dgm:t>
-    </dgm:pt>
-    <dgm:pt modelId="{71805F93-7F83-440E-B309-D34279A4B555}">
-      <dgm:prSet/>
-      <dgm:spPr/>
-      <dgm:t>
-        <a:bodyPr/>
-        <a:lstStyle/>
-        <a:p>
-          <a:r>
-            <a:rPr lang="de-DE" dirty="0">
-              <a:sym typeface="Wingdings" panose="05000000000000000000" pitchFamily="2" charset="2"/>
-            </a:rPr>
-            <a:t> </a:t>
-          </a:r>
-          <a:r>
-            <a:rPr lang="de-DE" dirty="0"/>
-            <a:t>Vorliegende Daten sind Maschinen Daten aus der Produktion</a:t>
-          </a:r>
-          <a:endParaRPr lang="en-US" dirty="0"/>
-        </a:p>
-      </dgm:t>
-    </dgm:pt>
-    <dgm:pt modelId="{D33B0420-9B5A-4B4C-9BF1-58F9E2BCEF28}" type="parTrans" cxnId="{29213BFC-A683-42B6-A00B-7206B21279C1}">
-      <dgm:prSet/>
-      <dgm:spPr/>
-      <dgm:t>
-        <a:bodyPr/>
-        <a:lstStyle/>
-        <a:p>
-          <a:endParaRPr lang="en-US"/>
-        </a:p>
-      </dgm:t>
-    </dgm:pt>
-    <dgm:pt modelId="{D6A24C5F-FDE7-4FAF-9557-65CF6EBD3A2D}" type="sibTrans" cxnId="{29213BFC-A683-42B6-A00B-7206B21279C1}">
-      <dgm:prSet/>
-      <dgm:spPr/>
-      <dgm:t>
-        <a:bodyPr/>
-        <a:lstStyle/>
-        <a:p>
-          <a:endParaRPr lang="en-US"/>
-        </a:p>
-      </dgm:t>
-    </dgm:pt>
-    <dgm:pt modelId="{90D088F7-F5C7-4618-8744-F81A17C3CC91}">
-      <dgm:prSet/>
-      <dgm:spPr/>
-      <dgm:t>
-        <a:bodyPr/>
-        <a:lstStyle/>
-        <a:p>
-          <a:r>
-            <a:rPr lang="de-DE" dirty="0">
-              <a:sym typeface="Wingdings" panose="05000000000000000000" pitchFamily="2" charset="2"/>
-            </a:rPr>
-            <a:t> </a:t>
-          </a:r>
-          <a:r>
-            <a:rPr lang="de-DE" dirty="0"/>
-            <a:t>Es sind Sensor Daten der Maschine vorhanden</a:t>
-          </a:r>
-          <a:endParaRPr lang="en-US" dirty="0"/>
-        </a:p>
-      </dgm:t>
-    </dgm:pt>
-    <dgm:pt modelId="{70311DEF-F328-417E-9BB4-524E6006E4A0}" type="parTrans" cxnId="{A649DD2F-097C-4AAF-8066-17BEF661AA55}">
-      <dgm:prSet/>
-      <dgm:spPr/>
-      <dgm:t>
-        <a:bodyPr/>
-        <a:lstStyle/>
-        <a:p>
-          <a:endParaRPr lang="en-US"/>
-        </a:p>
-      </dgm:t>
-    </dgm:pt>
-    <dgm:pt modelId="{A77D9DD8-81F0-4503-8850-627C25C0CCD6}" type="sibTrans" cxnId="{A649DD2F-097C-4AAF-8066-17BEF661AA55}">
-      <dgm:prSet/>
-      <dgm:spPr/>
-      <dgm:t>
-        <a:bodyPr/>
-        <a:lstStyle/>
-        <a:p>
-          <a:endParaRPr lang="en-US"/>
-        </a:p>
-      </dgm:t>
-    </dgm:pt>
-    <dgm:pt modelId="{2C5298F6-A493-4246-ACAB-D942090296F9}">
-      <dgm:prSet/>
-      <dgm:spPr/>
-      <dgm:t>
-        <a:bodyPr/>
-        <a:lstStyle/>
-        <a:p>
-          <a:r>
-            <a:rPr lang="de-DE" dirty="0">
-              <a:sym typeface="Wingdings" panose="05000000000000000000" pitchFamily="2" charset="2"/>
-            </a:rPr>
-            <a:t> </a:t>
-          </a:r>
-          <a:r>
-            <a:rPr lang="de-DE" dirty="0"/>
-            <a:t>Es sind Log Files vorhanden zu den Codes der Ausfälle</a:t>
-          </a:r>
-          <a:endParaRPr lang="en-US" dirty="0"/>
-        </a:p>
-      </dgm:t>
-    </dgm:pt>
-    <dgm:pt modelId="{43C432C7-5C48-4CFE-BAA0-68DC65637E4F}" type="parTrans" cxnId="{EB0CEC6D-E76B-4136-84BB-47D8B1FE6717}">
-      <dgm:prSet/>
-      <dgm:spPr/>
-      <dgm:t>
-        <a:bodyPr/>
-        <a:lstStyle/>
-        <a:p>
-          <a:endParaRPr lang="en-US"/>
-        </a:p>
-      </dgm:t>
-    </dgm:pt>
-    <dgm:pt modelId="{57B842D4-01E8-4DA7-AE2A-21D0118EB1D3}" type="sibTrans" cxnId="{EB0CEC6D-E76B-4136-84BB-47D8B1FE6717}">
-      <dgm:prSet/>
-      <dgm:spPr/>
-      <dgm:t>
-        <a:bodyPr/>
-        <a:lstStyle/>
-        <a:p>
-          <a:endParaRPr lang="en-US"/>
-        </a:p>
-      </dgm:t>
-    </dgm:pt>
-    <dgm:pt modelId="{879F0040-391C-4D5C-92FF-336E0B65604D}">
-      <dgm:prSet/>
-      <dgm:spPr/>
-      <dgm:t>
-        <a:bodyPr/>
-        <a:lstStyle/>
-        <a:p>
-          <a:r>
-            <a:rPr lang="de-DE" dirty="0">
-              <a:sym typeface="Wingdings" panose="05000000000000000000" pitchFamily="2" charset="2"/>
-            </a:rPr>
-            <a:t> </a:t>
-          </a:r>
-          <a:r>
-            <a:rPr lang="de-DE" dirty="0"/>
-            <a:t>Datenbankeinträge sind Momentaufnahmen und wiederholen sich 5 Minuten</a:t>
-          </a:r>
-          <a:endParaRPr lang="en-US" dirty="0"/>
-        </a:p>
-      </dgm:t>
-    </dgm:pt>
-    <dgm:pt modelId="{36839EA4-E336-44B9-BA42-8DFDD097167C}" type="parTrans" cxnId="{599A303E-AA0E-4709-BA73-333F3CDAEFA5}">
-      <dgm:prSet/>
-      <dgm:spPr/>
-      <dgm:t>
-        <a:bodyPr/>
-        <a:lstStyle/>
-        <a:p>
-          <a:endParaRPr lang="en-US"/>
-        </a:p>
-      </dgm:t>
-    </dgm:pt>
-    <dgm:pt modelId="{2C492082-E31E-4D5A-B4F4-166CE9CC5CD2}" type="sibTrans" cxnId="{599A303E-AA0E-4709-BA73-333F3CDAEFA5}">
-      <dgm:prSet/>
-      <dgm:spPr/>
-      <dgm:t>
-        <a:bodyPr/>
-        <a:lstStyle/>
-        <a:p>
-          <a:endParaRPr lang="en-US"/>
-        </a:p>
-      </dgm:t>
-    </dgm:pt>
-    <dgm:pt modelId="{AA4194FF-7B33-4304-8EE1-AA3992B92C19}" type="pres">
-      <dgm:prSet presAssocID="{32B5D352-1E80-4ADC-8F34-2C7161DD8167}" presName="vert0" presStyleCnt="0">
-        <dgm:presLayoutVars>
-          <dgm:dir/>
-          <dgm:animOne val="branch"/>
-          <dgm:animLvl val="lvl"/>
-        </dgm:presLayoutVars>
-      </dgm:prSet>
-      <dgm:spPr/>
-    </dgm:pt>
-    <dgm:pt modelId="{3B1956C2-D3BC-4B64-A547-FAAD60713C69}" type="pres">
-      <dgm:prSet presAssocID="{71805F93-7F83-440E-B309-D34279A4B555}" presName="thickLine" presStyleLbl="alignNode1" presStyleIdx="0" presStyleCnt="4"/>
-      <dgm:spPr/>
-    </dgm:pt>
-    <dgm:pt modelId="{D5A00DDD-DB7C-44FA-9BE4-9E0846C042E6}" type="pres">
-      <dgm:prSet presAssocID="{71805F93-7F83-440E-B309-D34279A4B555}" presName="horz1" presStyleCnt="0"/>
-      <dgm:spPr/>
-    </dgm:pt>
-    <dgm:pt modelId="{71D5278C-C71C-439B-9C94-D2EFC93CF49E}" type="pres">
-      <dgm:prSet presAssocID="{71805F93-7F83-440E-B309-D34279A4B555}" presName="tx1" presStyleLbl="revTx" presStyleIdx="0" presStyleCnt="4"/>
-      <dgm:spPr/>
-    </dgm:pt>
-    <dgm:pt modelId="{1583C4FA-4D04-48F6-A40A-40219B17840E}" type="pres">
-      <dgm:prSet presAssocID="{71805F93-7F83-440E-B309-D34279A4B555}" presName="vert1" presStyleCnt="0"/>
-      <dgm:spPr/>
-    </dgm:pt>
-    <dgm:pt modelId="{007EE07B-AD66-431E-87AE-111305FF36CC}" type="pres">
-      <dgm:prSet presAssocID="{879F0040-391C-4D5C-92FF-336E0B65604D}" presName="thickLine" presStyleLbl="alignNode1" presStyleIdx="1" presStyleCnt="4"/>
-      <dgm:spPr/>
-    </dgm:pt>
-    <dgm:pt modelId="{A79395F3-85FF-4887-B8AD-02B59CADBCB3}" type="pres">
-      <dgm:prSet presAssocID="{879F0040-391C-4D5C-92FF-336E0B65604D}" presName="horz1" presStyleCnt="0"/>
-      <dgm:spPr/>
-    </dgm:pt>
-    <dgm:pt modelId="{58743392-BD0E-483B-AF4E-A2CE3C99FB64}" type="pres">
-      <dgm:prSet presAssocID="{879F0040-391C-4D5C-92FF-336E0B65604D}" presName="tx1" presStyleLbl="revTx" presStyleIdx="1" presStyleCnt="4"/>
-      <dgm:spPr/>
-    </dgm:pt>
-    <dgm:pt modelId="{D0A501FC-5B75-492F-ADA1-CDDFC74F136F}" type="pres">
-      <dgm:prSet presAssocID="{879F0040-391C-4D5C-92FF-336E0B65604D}" presName="vert1" presStyleCnt="0"/>
-      <dgm:spPr/>
-    </dgm:pt>
-    <dgm:pt modelId="{142B6D18-19C5-467E-9728-F1D4B452A777}" type="pres">
-      <dgm:prSet presAssocID="{90D088F7-F5C7-4618-8744-F81A17C3CC91}" presName="thickLine" presStyleLbl="alignNode1" presStyleIdx="2" presStyleCnt="4"/>
-      <dgm:spPr/>
-    </dgm:pt>
-    <dgm:pt modelId="{DB983CAD-A9CE-4697-89F9-32890205DA42}" type="pres">
-      <dgm:prSet presAssocID="{90D088F7-F5C7-4618-8744-F81A17C3CC91}" presName="horz1" presStyleCnt="0"/>
-      <dgm:spPr/>
-    </dgm:pt>
-    <dgm:pt modelId="{C0A36620-F4CE-437A-A031-8E9BE4FF52FE}" type="pres">
-      <dgm:prSet presAssocID="{90D088F7-F5C7-4618-8744-F81A17C3CC91}" presName="tx1" presStyleLbl="revTx" presStyleIdx="2" presStyleCnt="4"/>
-      <dgm:spPr/>
-    </dgm:pt>
-    <dgm:pt modelId="{9ED5A53A-C4A6-495A-8818-3A33F1ED0CF9}" type="pres">
-      <dgm:prSet presAssocID="{90D088F7-F5C7-4618-8744-F81A17C3CC91}" presName="vert1" presStyleCnt="0"/>
-      <dgm:spPr/>
-    </dgm:pt>
-    <dgm:pt modelId="{4DDB9EC5-ADB2-4E47-9108-9700D557EC5E}" type="pres">
-      <dgm:prSet presAssocID="{2C5298F6-A493-4246-ACAB-D942090296F9}" presName="thickLine" presStyleLbl="alignNode1" presStyleIdx="3" presStyleCnt="4"/>
-      <dgm:spPr/>
-    </dgm:pt>
-    <dgm:pt modelId="{75C7550D-5241-4207-A42B-99774CC71780}" type="pres">
-      <dgm:prSet presAssocID="{2C5298F6-A493-4246-ACAB-D942090296F9}" presName="horz1" presStyleCnt="0"/>
-      <dgm:spPr/>
-    </dgm:pt>
-    <dgm:pt modelId="{D5FD4061-508C-4BF8-83B5-36E3FD7D3AFD}" type="pres">
-      <dgm:prSet presAssocID="{2C5298F6-A493-4246-ACAB-D942090296F9}" presName="tx1" presStyleLbl="revTx" presStyleIdx="3" presStyleCnt="4"/>
-      <dgm:spPr/>
-    </dgm:pt>
-    <dgm:pt modelId="{33062A29-B47A-489B-AA6D-D1F0CEA461E5}" type="pres">
-      <dgm:prSet presAssocID="{2C5298F6-A493-4246-ACAB-D942090296F9}" presName="vert1" presStyleCnt="0"/>
-      <dgm:spPr/>
-    </dgm:pt>
-  </dgm:ptLst>
-  <dgm:cxnLst>
-    <dgm:cxn modelId="{85BA841F-DD58-40AE-9698-4D2D0BB1DDA4}" type="presOf" srcId="{90D088F7-F5C7-4618-8744-F81A17C3CC91}" destId="{C0A36620-F4CE-437A-A031-8E9BE4FF52FE}" srcOrd="0" destOrd="0" presId="urn:microsoft.com/office/officeart/2008/layout/LinedList"/>
-    <dgm:cxn modelId="{A649DD2F-097C-4AAF-8066-17BEF661AA55}" srcId="{32B5D352-1E80-4ADC-8F34-2C7161DD8167}" destId="{90D088F7-F5C7-4618-8744-F81A17C3CC91}" srcOrd="2" destOrd="0" parTransId="{70311DEF-F328-417E-9BB4-524E6006E4A0}" sibTransId="{A77D9DD8-81F0-4503-8850-627C25C0CCD6}"/>
-    <dgm:cxn modelId="{599A303E-AA0E-4709-BA73-333F3CDAEFA5}" srcId="{32B5D352-1E80-4ADC-8F34-2C7161DD8167}" destId="{879F0040-391C-4D5C-92FF-336E0B65604D}" srcOrd="1" destOrd="0" parTransId="{36839EA4-E336-44B9-BA42-8DFDD097167C}" sibTransId="{2C492082-E31E-4D5A-B4F4-166CE9CC5CD2}"/>
-    <dgm:cxn modelId="{EB0CEC6D-E76B-4136-84BB-47D8B1FE6717}" srcId="{32B5D352-1E80-4ADC-8F34-2C7161DD8167}" destId="{2C5298F6-A493-4246-ACAB-D942090296F9}" srcOrd="3" destOrd="0" parTransId="{43C432C7-5C48-4CFE-BAA0-68DC65637E4F}" sibTransId="{57B842D4-01E8-4DA7-AE2A-21D0118EB1D3}"/>
-    <dgm:cxn modelId="{30916B59-3682-4BC2-ADF2-DD679E2828FA}" type="presOf" srcId="{879F0040-391C-4D5C-92FF-336E0B65604D}" destId="{58743392-BD0E-483B-AF4E-A2CE3C99FB64}" srcOrd="0" destOrd="0" presId="urn:microsoft.com/office/officeart/2008/layout/LinedList"/>
-    <dgm:cxn modelId="{2947379F-6650-48EC-9673-A23A9ED13785}" type="presOf" srcId="{71805F93-7F83-440E-B309-D34279A4B555}" destId="{71D5278C-C71C-439B-9C94-D2EFC93CF49E}" srcOrd="0" destOrd="0" presId="urn:microsoft.com/office/officeart/2008/layout/LinedList"/>
-    <dgm:cxn modelId="{683770CB-2F2D-4C95-A6D0-5D5F1CCA3856}" type="presOf" srcId="{32B5D352-1E80-4ADC-8F34-2C7161DD8167}" destId="{AA4194FF-7B33-4304-8EE1-AA3992B92C19}" srcOrd="0" destOrd="0" presId="urn:microsoft.com/office/officeart/2008/layout/LinedList"/>
-    <dgm:cxn modelId="{B27524E1-8068-4D07-8256-00F3055B8048}" type="presOf" srcId="{2C5298F6-A493-4246-ACAB-D942090296F9}" destId="{D5FD4061-508C-4BF8-83B5-36E3FD7D3AFD}" srcOrd="0" destOrd="0" presId="urn:microsoft.com/office/officeart/2008/layout/LinedList"/>
-    <dgm:cxn modelId="{29213BFC-A683-42B6-A00B-7206B21279C1}" srcId="{32B5D352-1E80-4ADC-8F34-2C7161DD8167}" destId="{71805F93-7F83-440E-B309-D34279A4B555}" srcOrd="0" destOrd="0" parTransId="{D33B0420-9B5A-4B4C-9BF1-58F9E2BCEF28}" sibTransId="{D6A24C5F-FDE7-4FAF-9557-65CF6EBD3A2D}"/>
-    <dgm:cxn modelId="{5627526D-CFD2-40F4-8272-60A7C68CF024}" type="presParOf" srcId="{AA4194FF-7B33-4304-8EE1-AA3992B92C19}" destId="{3B1956C2-D3BC-4B64-A547-FAAD60713C69}" srcOrd="0" destOrd="0" presId="urn:microsoft.com/office/officeart/2008/layout/LinedList"/>
-    <dgm:cxn modelId="{BF9EC0D2-0218-4928-A196-84EDC42C4518}" type="presParOf" srcId="{AA4194FF-7B33-4304-8EE1-AA3992B92C19}" destId="{D5A00DDD-DB7C-44FA-9BE4-9E0846C042E6}" srcOrd="1" destOrd="0" presId="urn:microsoft.com/office/officeart/2008/layout/LinedList"/>
-    <dgm:cxn modelId="{9D9E4031-DC96-4F00-9A92-D7337D55982C}" type="presParOf" srcId="{D5A00DDD-DB7C-44FA-9BE4-9E0846C042E6}" destId="{71D5278C-C71C-439B-9C94-D2EFC93CF49E}" srcOrd="0" destOrd="0" presId="urn:microsoft.com/office/officeart/2008/layout/LinedList"/>
-    <dgm:cxn modelId="{72D1F3D5-B373-4865-8AC2-07C6468C221F}" type="presParOf" srcId="{D5A00DDD-DB7C-44FA-9BE4-9E0846C042E6}" destId="{1583C4FA-4D04-48F6-A40A-40219B17840E}" srcOrd="1" destOrd="0" presId="urn:microsoft.com/office/officeart/2008/layout/LinedList"/>
-    <dgm:cxn modelId="{472921EE-CABE-43D3-8727-B2D1E9D5DFD6}" type="presParOf" srcId="{AA4194FF-7B33-4304-8EE1-AA3992B92C19}" destId="{007EE07B-AD66-431E-87AE-111305FF36CC}" srcOrd="2" destOrd="0" presId="urn:microsoft.com/office/officeart/2008/layout/LinedList"/>
-    <dgm:cxn modelId="{1DB6DED0-0121-4B4F-8884-280B33431CCC}" type="presParOf" srcId="{AA4194FF-7B33-4304-8EE1-AA3992B92C19}" destId="{A79395F3-85FF-4887-B8AD-02B59CADBCB3}" srcOrd="3" destOrd="0" presId="urn:microsoft.com/office/officeart/2008/layout/LinedList"/>
-    <dgm:cxn modelId="{34AE6A2B-3DA6-49C4-8303-0BF0446AE7D6}" type="presParOf" srcId="{A79395F3-85FF-4887-B8AD-02B59CADBCB3}" destId="{58743392-BD0E-483B-AF4E-A2CE3C99FB64}" srcOrd="0" destOrd="0" presId="urn:microsoft.com/office/officeart/2008/layout/LinedList"/>
-    <dgm:cxn modelId="{BD43AE03-7046-46D2-89AF-3C4D01F651CA}" type="presParOf" srcId="{A79395F3-85FF-4887-B8AD-02B59CADBCB3}" destId="{D0A501FC-5B75-492F-ADA1-CDDFC74F136F}" srcOrd="1" destOrd="0" presId="urn:microsoft.com/office/officeart/2008/layout/LinedList"/>
-    <dgm:cxn modelId="{98113063-CC77-474C-B386-6E8EB1B342FC}" type="presParOf" srcId="{AA4194FF-7B33-4304-8EE1-AA3992B92C19}" destId="{142B6D18-19C5-467E-9728-F1D4B452A777}" srcOrd="4" destOrd="0" presId="urn:microsoft.com/office/officeart/2008/layout/LinedList"/>
-    <dgm:cxn modelId="{50AD2144-886F-4D66-96CB-C71258A53619}" type="presParOf" srcId="{AA4194FF-7B33-4304-8EE1-AA3992B92C19}" destId="{DB983CAD-A9CE-4697-89F9-32890205DA42}" srcOrd="5" destOrd="0" presId="urn:microsoft.com/office/officeart/2008/layout/LinedList"/>
-    <dgm:cxn modelId="{CC5D5946-746B-40DC-B423-FC706951EB1D}" type="presParOf" srcId="{DB983CAD-A9CE-4697-89F9-32890205DA42}" destId="{C0A36620-F4CE-437A-A031-8E9BE4FF52FE}" srcOrd="0" destOrd="0" presId="urn:microsoft.com/office/officeart/2008/layout/LinedList"/>
-    <dgm:cxn modelId="{E90E057C-EA1A-4ABD-A6C5-C2F327E851EF}" type="presParOf" srcId="{DB983CAD-A9CE-4697-89F9-32890205DA42}" destId="{9ED5A53A-C4A6-495A-8818-3A33F1ED0CF9}" srcOrd="1" destOrd="0" presId="urn:microsoft.com/office/officeart/2008/layout/LinedList"/>
-    <dgm:cxn modelId="{E183E969-5E25-4E8C-8C7C-7142FE0681EA}" type="presParOf" srcId="{AA4194FF-7B33-4304-8EE1-AA3992B92C19}" destId="{4DDB9EC5-ADB2-4E47-9108-9700D557EC5E}" srcOrd="6" destOrd="0" presId="urn:microsoft.com/office/officeart/2008/layout/LinedList"/>
-    <dgm:cxn modelId="{4382583C-FA2C-4DAF-892B-02CD78F86AB0}" type="presParOf" srcId="{AA4194FF-7B33-4304-8EE1-AA3992B92C19}" destId="{75C7550D-5241-4207-A42B-99774CC71780}" srcOrd="7" destOrd="0" presId="urn:microsoft.com/office/officeart/2008/layout/LinedList"/>
-    <dgm:cxn modelId="{736A046A-2082-451B-9B25-1DB469BA7032}" type="presParOf" srcId="{75C7550D-5241-4207-A42B-99774CC71780}" destId="{D5FD4061-508C-4BF8-83B5-36E3FD7D3AFD}" srcOrd="0" destOrd="0" presId="urn:microsoft.com/office/officeart/2008/layout/LinedList"/>
-    <dgm:cxn modelId="{2A4C7D75-B6D5-4AC2-AD2A-D42DC73D7143}" type="presParOf" srcId="{75C7550D-5241-4207-A42B-99774CC71780}" destId="{33062A29-B47A-489B-AA6D-D1F0CEA461E5}" srcOrd="1" destOrd="0" presId="urn:microsoft.com/office/officeart/2008/layout/LinedList"/>
-  </dgm:cxnLst>
-  <dgm:bg/>
-  <dgm:whole/>
-  <dgm:extLst>
-    <a:ext uri="http://schemas.microsoft.com/office/drawing/2008/diagram">
-      <dsp:dataModelExt xmlns:dsp="http://schemas.microsoft.com/office/drawing/2008/diagram" relId="rId6" minVer="http://schemas.openxmlformats.org/drawingml/2006/diagram"/>
-    </a:ext>
-  </dgm:extLst>
-</dgm:dataModel>
-</file>
-
-<file path=ppt/diagrams/data2.xml><?xml version="1.0" encoding="utf-8"?>
 <dgm:dataModel xmlns:dgm="http://schemas.openxmlformats.org/drawingml/2006/diagram" xmlns:a="http://schemas.openxmlformats.org/drawingml/2006/main">
   <dgm:ptLst>
     <dgm:pt modelId="{32B5D352-1E80-4ADC-8F34-2C7161DD8167}" type="doc">
@@ -3341,7 +2295,7 @@
 </dgm:dataModel>
 </file>
 
-<file path=ppt/diagrams/data3.xml><?xml version="1.0" encoding="utf-8"?>
+<file path=ppt/diagrams/data2.xml><?xml version="1.0" encoding="utf-8"?>
 <dgm:dataModel xmlns:dgm="http://schemas.openxmlformats.org/drawingml/2006/diagram" xmlns:a="http://schemas.openxmlformats.org/drawingml/2006/main">
   <dgm:ptLst>
     <dgm:pt modelId="{32B5D352-1E80-4ADC-8F34-2C7161DD8167}" type="doc">
@@ -3695,486 +2649,6 @@
 </file>
 
 <file path=ppt/diagrams/drawing1.xml><?xml version="1.0" encoding="utf-8"?>
-<dsp:drawing xmlns:dgm="http://schemas.openxmlformats.org/drawingml/2006/diagram" xmlns:dsp="http://schemas.microsoft.com/office/drawing/2008/diagram" xmlns:a="http://schemas.openxmlformats.org/drawingml/2006/main">
-  <dsp:spTree>
-    <dsp:nvGrpSpPr>
-      <dsp:cNvPr id="0" name=""/>
-      <dsp:cNvGrpSpPr/>
-    </dsp:nvGrpSpPr>
-    <dsp:grpSpPr/>
-    <dsp:sp modelId="{3B1956C2-D3BC-4B64-A547-FAAD60713C69}">
-      <dsp:nvSpPr>
-        <dsp:cNvPr id="0" name=""/>
-        <dsp:cNvSpPr/>
-      </dsp:nvSpPr>
-      <dsp:spPr>
-        <a:xfrm>
-          <a:off x="0" y="0"/>
-          <a:ext cx="10515600" cy="0"/>
-        </a:xfrm>
-        <a:prstGeom prst="line">
-          <a:avLst/>
-        </a:prstGeom>
-        <a:solidFill>
-          <a:schemeClr val="accent1">
-            <a:hueOff val="0"/>
-            <a:satOff val="0"/>
-            <a:lumOff val="0"/>
-            <a:alphaOff val="0"/>
-          </a:schemeClr>
-        </a:solidFill>
-        <a:ln w="12700" cap="flat" cmpd="sng" algn="ctr">
-          <a:solidFill>
-            <a:schemeClr val="accent1">
-              <a:hueOff val="0"/>
-              <a:satOff val="0"/>
-              <a:lumOff val="0"/>
-              <a:alphaOff val="0"/>
-            </a:schemeClr>
-          </a:solidFill>
-          <a:prstDash val="solid"/>
-          <a:miter lim="800000"/>
-        </a:ln>
-        <a:effectLst/>
-      </dsp:spPr>
-      <dsp:style>
-        <a:lnRef idx="2">
-          <a:scrgbClr r="0" g="0" b="0"/>
-        </a:lnRef>
-        <a:fillRef idx="1">
-          <a:scrgbClr r="0" g="0" b="0"/>
-        </a:fillRef>
-        <a:effectRef idx="0">
-          <a:scrgbClr r="0" g="0" b="0"/>
-        </a:effectRef>
-        <a:fontRef idx="minor">
-          <a:schemeClr val="lt1"/>
-        </a:fontRef>
-      </dsp:style>
-    </dsp:sp>
-    <dsp:sp modelId="{71D5278C-C71C-439B-9C94-D2EFC93CF49E}">
-      <dsp:nvSpPr>
-        <dsp:cNvPr id="0" name=""/>
-        <dsp:cNvSpPr/>
-      </dsp:nvSpPr>
-      <dsp:spPr>
-        <a:xfrm>
-          <a:off x="0" y="0"/>
-          <a:ext cx="10515600" cy="776648"/>
-        </a:xfrm>
-        <a:prstGeom prst="rect">
-          <a:avLst/>
-        </a:prstGeom>
-        <a:noFill/>
-        <a:ln>
-          <a:noFill/>
-        </a:ln>
-        <a:effectLst/>
-      </dsp:spPr>
-      <dsp:style>
-        <a:lnRef idx="0">
-          <a:scrgbClr r="0" g="0" b="0"/>
-        </a:lnRef>
-        <a:fillRef idx="0">
-          <a:scrgbClr r="0" g="0" b="0"/>
-        </a:fillRef>
-        <a:effectRef idx="0">
-          <a:scrgbClr r="0" g="0" b="0"/>
-        </a:effectRef>
-        <a:fontRef idx="minor"/>
-      </dsp:style>
-      <dsp:txBody>
-        <a:bodyPr spcFirstLastPara="0" vert="horz" wrap="square" lIns="91440" tIns="91440" rIns="91440" bIns="91440" numCol="1" spcCol="1270" anchor="t" anchorCtr="0">
-          <a:noAutofit/>
-        </a:bodyPr>
-        <a:lstStyle/>
-        <a:p>
-          <a:pPr marL="0" lvl="0" indent="0" algn="l" defTabSz="1066800">
-            <a:lnSpc>
-              <a:spcPct val="90000"/>
-            </a:lnSpc>
-            <a:spcBef>
-              <a:spcPct val="0"/>
-            </a:spcBef>
-            <a:spcAft>
-              <a:spcPct val="35000"/>
-            </a:spcAft>
-            <a:buNone/>
-          </a:pPr>
-          <a:r>
-            <a:rPr lang="de-DE" sz="2400" kern="1200" dirty="0">
-              <a:sym typeface="Wingdings" panose="05000000000000000000" pitchFamily="2" charset="2"/>
-            </a:rPr>
-            <a:t> </a:t>
-          </a:r>
-          <a:r>
-            <a:rPr lang="de-DE" sz="2400" kern="1200" dirty="0"/>
-            <a:t>Vorliegende Daten sind Maschinen Daten aus der Produktion</a:t>
-          </a:r>
-          <a:endParaRPr lang="en-US" sz="2400" kern="1200" dirty="0"/>
-        </a:p>
-      </dsp:txBody>
-      <dsp:txXfrm>
-        <a:off x="0" y="0"/>
-        <a:ext cx="10515600" cy="776648"/>
-      </dsp:txXfrm>
-    </dsp:sp>
-    <dsp:sp modelId="{007EE07B-AD66-431E-87AE-111305FF36CC}">
-      <dsp:nvSpPr>
-        <dsp:cNvPr id="0" name=""/>
-        <dsp:cNvSpPr/>
-      </dsp:nvSpPr>
-      <dsp:spPr>
-        <a:xfrm>
-          <a:off x="0" y="776648"/>
-          <a:ext cx="10515600" cy="0"/>
-        </a:xfrm>
-        <a:prstGeom prst="line">
-          <a:avLst/>
-        </a:prstGeom>
-        <a:solidFill>
-          <a:schemeClr val="accent1">
-            <a:hueOff val="0"/>
-            <a:satOff val="0"/>
-            <a:lumOff val="0"/>
-            <a:alphaOff val="0"/>
-          </a:schemeClr>
-        </a:solidFill>
-        <a:ln w="12700" cap="flat" cmpd="sng" algn="ctr">
-          <a:solidFill>
-            <a:schemeClr val="accent1">
-              <a:hueOff val="0"/>
-              <a:satOff val="0"/>
-              <a:lumOff val="0"/>
-              <a:alphaOff val="0"/>
-            </a:schemeClr>
-          </a:solidFill>
-          <a:prstDash val="solid"/>
-          <a:miter lim="800000"/>
-        </a:ln>
-        <a:effectLst/>
-      </dsp:spPr>
-      <dsp:style>
-        <a:lnRef idx="2">
-          <a:scrgbClr r="0" g="0" b="0"/>
-        </a:lnRef>
-        <a:fillRef idx="1">
-          <a:scrgbClr r="0" g="0" b="0"/>
-        </a:fillRef>
-        <a:effectRef idx="0">
-          <a:scrgbClr r="0" g="0" b="0"/>
-        </a:effectRef>
-        <a:fontRef idx="minor">
-          <a:schemeClr val="lt1"/>
-        </a:fontRef>
-      </dsp:style>
-    </dsp:sp>
-    <dsp:sp modelId="{58743392-BD0E-483B-AF4E-A2CE3C99FB64}">
-      <dsp:nvSpPr>
-        <dsp:cNvPr id="0" name=""/>
-        <dsp:cNvSpPr/>
-      </dsp:nvSpPr>
-      <dsp:spPr>
-        <a:xfrm>
-          <a:off x="0" y="776648"/>
-          <a:ext cx="10515600" cy="776648"/>
-        </a:xfrm>
-        <a:prstGeom prst="rect">
-          <a:avLst/>
-        </a:prstGeom>
-        <a:noFill/>
-        <a:ln>
-          <a:noFill/>
-        </a:ln>
-        <a:effectLst/>
-      </dsp:spPr>
-      <dsp:style>
-        <a:lnRef idx="0">
-          <a:scrgbClr r="0" g="0" b="0"/>
-        </a:lnRef>
-        <a:fillRef idx="0">
-          <a:scrgbClr r="0" g="0" b="0"/>
-        </a:fillRef>
-        <a:effectRef idx="0">
-          <a:scrgbClr r="0" g="0" b="0"/>
-        </a:effectRef>
-        <a:fontRef idx="minor"/>
-      </dsp:style>
-      <dsp:txBody>
-        <a:bodyPr spcFirstLastPara="0" vert="horz" wrap="square" lIns="91440" tIns="91440" rIns="91440" bIns="91440" numCol="1" spcCol="1270" anchor="t" anchorCtr="0">
-          <a:noAutofit/>
-        </a:bodyPr>
-        <a:lstStyle/>
-        <a:p>
-          <a:pPr marL="0" lvl="0" indent="0" algn="l" defTabSz="1066800">
-            <a:lnSpc>
-              <a:spcPct val="90000"/>
-            </a:lnSpc>
-            <a:spcBef>
-              <a:spcPct val="0"/>
-            </a:spcBef>
-            <a:spcAft>
-              <a:spcPct val="35000"/>
-            </a:spcAft>
-            <a:buNone/>
-          </a:pPr>
-          <a:r>
-            <a:rPr lang="de-DE" sz="2400" kern="1200" dirty="0">
-              <a:sym typeface="Wingdings" panose="05000000000000000000" pitchFamily="2" charset="2"/>
-            </a:rPr>
-            <a:t> </a:t>
-          </a:r>
-          <a:r>
-            <a:rPr lang="de-DE" sz="2400" kern="1200" dirty="0"/>
-            <a:t>Datenbankeinträge sind Momentaufnahmen und wiederholen sich 5 Minuten</a:t>
-          </a:r>
-          <a:endParaRPr lang="en-US" sz="2400" kern="1200" dirty="0"/>
-        </a:p>
-      </dsp:txBody>
-      <dsp:txXfrm>
-        <a:off x="0" y="776648"/>
-        <a:ext cx="10515600" cy="776648"/>
-      </dsp:txXfrm>
-    </dsp:sp>
-    <dsp:sp modelId="{142B6D18-19C5-467E-9728-F1D4B452A777}">
-      <dsp:nvSpPr>
-        <dsp:cNvPr id="0" name=""/>
-        <dsp:cNvSpPr/>
-      </dsp:nvSpPr>
-      <dsp:spPr>
-        <a:xfrm>
-          <a:off x="0" y="1553296"/>
-          <a:ext cx="10515600" cy="0"/>
-        </a:xfrm>
-        <a:prstGeom prst="line">
-          <a:avLst/>
-        </a:prstGeom>
-        <a:solidFill>
-          <a:schemeClr val="accent1">
-            <a:hueOff val="0"/>
-            <a:satOff val="0"/>
-            <a:lumOff val="0"/>
-            <a:alphaOff val="0"/>
-          </a:schemeClr>
-        </a:solidFill>
-        <a:ln w="12700" cap="flat" cmpd="sng" algn="ctr">
-          <a:solidFill>
-            <a:schemeClr val="accent1">
-              <a:hueOff val="0"/>
-              <a:satOff val="0"/>
-              <a:lumOff val="0"/>
-              <a:alphaOff val="0"/>
-            </a:schemeClr>
-          </a:solidFill>
-          <a:prstDash val="solid"/>
-          <a:miter lim="800000"/>
-        </a:ln>
-        <a:effectLst/>
-      </dsp:spPr>
-      <dsp:style>
-        <a:lnRef idx="2">
-          <a:scrgbClr r="0" g="0" b="0"/>
-        </a:lnRef>
-        <a:fillRef idx="1">
-          <a:scrgbClr r="0" g="0" b="0"/>
-        </a:fillRef>
-        <a:effectRef idx="0">
-          <a:scrgbClr r="0" g="0" b="0"/>
-        </a:effectRef>
-        <a:fontRef idx="minor">
-          <a:schemeClr val="lt1"/>
-        </a:fontRef>
-      </dsp:style>
-    </dsp:sp>
-    <dsp:sp modelId="{C0A36620-F4CE-437A-A031-8E9BE4FF52FE}">
-      <dsp:nvSpPr>
-        <dsp:cNvPr id="0" name=""/>
-        <dsp:cNvSpPr/>
-      </dsp:nvSpPr>
-      <dsp:spPr>
-        <a:xfrm>
-          <a:off x="0" y="1553296"/>
-          <a:ext cx="10515600" cy="776648"/>
-        </a:xfrm>
-        <a:prstGeom prst="rect">
-          <a:avLst/>
-        </a:prstGeom>
-        <a:noFill/>
-        <a:ln>
-          <a:noFill/>
-        </a:ln>
-        <a:effectLst/>
-      </dsp:spPr>
-      <dsp:style>
-        <a:lnRef idx="0">
-          <a:scrgbClr r="0" g="0" b="0"/>
-        </a:lnRef>
-        <a:fillRef idx="0">
-          <a:scrgbClr r="0" g="0" b="0"/>
-        </a:fillRef>
-        <a:effectRef idx="0">
-          <a:scrgbClr r="0" g="0" b="0"/>
-        </a:effectRef>
-        <a:fontRef idx="minor"/>
-      </dsp:style>
-      <dsp:txBody>
-        <a:bodyPr spcFirstLastPara="0" vert="horz" wrap="square" lIns="91440" tIns="91440" rIns="91440" bIns="91440" numCol="1" spcCol="1270" anchor="t" anchorCtr="0">
-          <a:noAutofit/>
-        </a:bodyPr>
-        <a:lstStyle/>
-        <a:p>
-          <a:pPr marL="0" lvl="0" indent="0" algn="l" defTabSz="1066800">
-            <a:lnSpc>
-              <a:spcPct val="90000"/>
-            </a:lnSpc>
-            <a:spcBef>
-              <a:spcPct val="0"/>
-            </a:spcBef>
-            <a:spcAft>
-              <a:spcPct val="35000"/>
-            </a:spcAft>
-            <a:buNone/>
-          </a:pPr>
-          <a:r>
-            <a:rPr lang="de-DE" sz="2400" kern="1200" dirty="0">
-              <a:sym typeface="Wingdings" panose="05000000000000000000" pitchFamily="2" charset="2"/>
-            </a:rPr>
-            <a:t> </a:t>
-          </a:r>
-          <a:r>
-            <a:rPr lang="de-DE" sz="2400" kern="1200" dirty="0"/>
-            <a:t>Es sind Sensor Daten der Maschine vorhanden</a:t>
-          </a:r>
-          <a:endParaRPr lang="en-US" sz="2400" kern="1200" dirty="0"/>
-        </a:p>
-      </dsp:txBody>
-      <dsp:txXfrm>
-        <a:off x="0" y="1553296"/>
-        <a:ext cx="10515600" cy="776648"/>
-      </dsp:txXfrm>
-    </dsp:sp>
-    <dsp:sp modelId="{4DDB9EC5-ADB2-4E47-9108-9700D557EC5E}">
-      <dsp:nvSpPr>
-        <dsp:cNvPr id="0" name=""/>
-        <dsp:cNvSpPr/>
-      </dsp:nvSpPr>
-      <dsp:spPr>
-        <a:xfrm>
-          <a:off x="0" y="2329944"/>
-          <a:ext cx="10515600" cy="0"/>
-        </a:xfrm>
-        <a:prstGeom prst="line">
-          <a:avLst/>
-        </a:prstGeom>
-        <a:solidFill>
-          <a:schemeClr val="accent1">
-            <a:hueOff val="0"/>
-            <a:satOff val="0"/>
-            <a:lumOff val="0"/>
-            <a:alphaOff val="0"/>
-          </a:schemeClr>
-        </a:solidFill>
-        <a:ln w="12700" cap="flat" cmpd="sng" algn="ctr">
-          <a:solidFill>
-            <a:schemeClr val="accent1">
-              <a:hueOff val="0"/>
-              <a:satOff val="0"/>
-              <a:lumOff val="0"/>
-              <a:alphaOff val="0"/>
-            </a:schemeClr>
-          </a:solidFill>
-          <a:prstDash val="solid"/>
-          <a:miter lim="800000"/>
-        </a:ln>
-        <a:effectLst/>
-      </dsp:spPr>
-      <dsp:style>
-        <a:lnRef idx="2">
-          <a:scrgbClr r="0" g="0" b="0"/>
-        </a:lnRef>
-        <a:fillRef idx="1">
-          <a:scrgbClr r="0" g="0" b="0"/>
-        </a:fillRef>
-        <a:effectRef idx="0">
-          <a:scrgbClr r="0" g="0" b="0"/>
-        </a:effectRef>
-        <a:fontRef idx="minor">
-          <a:schemeClr val="lt1"/>
-        </a:fontRef>
-      </dsp:style>
-    </dsp:sp>
-    <dsp:sp modelId="{D5FD4061-508C-4BF8-83B5-36E3FD7D3AFD}">
-      <dsp:nvSpPr>
-        <dsp:cNvPr id="0" name=""/>
-        <dsp:cNvSpPr/>
-      </dsp:nvSpPr>
-      <dsp:spPr>
-        <a:xfrm>
-          <a:off x="0" y="2329944"/>
-          <a:ext cx="10515600" cy="776648"/>
-        </a:xfrm>
-        <a:prstGeom prst="rect">
-          <a:avLst/>
-        </a:prstGeom>
-        <a:noFill/>
-        <a:ln>
-          <a:noFill/>
-        </a:ln>
-        <a:effectLst/>
-      </dsp:spPr>
-      <dsp:style>
-        <a:lnRef idx="0">
-          <a:scrgbClr r="0" g="0" b="0"/>
-        </a:lnRef>
-        <a:fillRef idx="0">
-          <a:scrgbClr r="0" g="0" b="0"/>
-        </a:fillRef>
-        <a:effectRef idx="0">
-          <a:scrgbClr r="0" g="0" b="0"/>
-        </a:effectRef>
-        <a:fontRef idx="minor"/>
-      </dsp:style>
-      <dsp:txBody>
-        <a:bodyPr spcFirstLastPara="0" vert="horz" wrap="square" lIns="91440" tIns="91440" rIns="91440" bIns="91440" numCol="1" spcCol="1270" anchor="t" anchorCtr="0">
-          <a:noAutofit/>
-        </a:bodyPr>
-        <a:lstStyle/>
-        <a:p>
-          <a:pPr marL="0" lvl="0" indent="0" algn="l" defTabSz="1066800">
-            <a:lnSpc>
-              <a:spcPct val="90000"/>
-            </a:lnSpc>
-            <a:spcBef>
-              <a:spcPct val="0"/>
-            </a:spcBef>
-            <a:spcAft>
-              <a:spcPct val="35000"/>
-            </a:spcAft>
-            <a:buNone/>
-          </a:pPr>
-          <a:r>
-            <a:rPr lang="de-DE" sz="2400" kern="1200" dirty="0">
-              <a:sym typeface="Wingdings" panose="05000000000000000000" pitchFamily="2" charset="2"/>
-            </a:rPr>
-            <a:t> </a:t>
-          </a:r>
-          <a:r>
-            <a:rPr lang="de-DE" sz="2400" kern="1200" dirty="0"/>
-            <a:t>Es sind Log Files vorhanden zu den Codes der Ausfälle</a:t>
-          </a:r>
-          <a:endParaRPr lang="en-US" sz="2400" kern="1200" dirty="0"/>
-        </a:p>
-      </dsp:txBody>
-      <dsp:txXfrm>
-        <a:off x="0" y="2329944"/>
-        <a:ext cx="10515600" cy="776648"/>
-      </dsp:txXfrm>
-    </dsp:sp>
-  </dsp:spTree>
-</dsp:drawing>
-</file>
-
-<file path=ppt/diagrams/drawing2.xml><?xml version="1.0" encoding="utf-8"?>
 <dsp:drawing xmlns:dgm="http://schemas.openxmlformats.org/drawingml/2006/diagram" xmlns:dsp="http://schemas.microsoft.com/office/drawing/2008/diagram" xmlns:a="http://schemas.openxmlformats.org/drawingml/2006/main">
   <dsp:spTree>
     <dsp:nvGrpSpPr>
@@ -4745,7 +3219,7 @@
 </dsp:drawing>
 </file>
 
-<file path=ppt/diagrams/drawing3.xml><?xml version="1.0" encoding="utf-8"?>
+<file path=ppt/diagrams/drawing2.xml><?xml version="1.0" encoding="utf-8"?>
 <dsp:drawing xmlns:dgm="http://schemas.openxmlformats.org/drawingml/2006/diagram" xmlns:dsp="http://schemas.microsoft.com/office/drawing/2008/diagram" xmlns:a="http://schemas.openxmlformats.org/drawingml/2006/main">
   <dsp:spTree>
     <dsp:nvGrpSpPr>
@@ -6264,472 +4738,6 @@
 </dgm:layoutDef>
 </file>
 
-<file path=ppt/diagrams/layout3.xml><?xml version="1.0" encoding="utf-8"?>
-<dgm:layoutDef xmlns:dgm="http://schemas.openxmlformats.org/drawingml/2006/diagram" xmlns:a="http://schemas.openxmlformats.org/drawingml/2006/main" uniqueId="urn:microsoft.com/office/officeart/2008/layout/LinedList">
-  <dgm:title val=""/>
-  <dgm:desc val=""/>
-  <dgm:catLst>
-    <dgm:cat type="hierarchy" pri="8000"/>
-    <dgm:cat type="list" pri="2500"/>
-  </dgm:catLst>
-  <dgm:sampData>
-    <dgm:dataModel>
-      <dgm:ptLst>
-        <dgm:pt modelId="0" type="doc"/>
-        <dgm:pt modelId="1">
-          <dgm:prSet phldr="1"/>
-        </dgm:pt>
-        <dgm:pt modelId="11">
-          <dgm:prSet phldr="1"/>
-        </dgm:pt>
-        <dgm:pt modelId="12">
-          <dgm:prSet phldr="1"/>
-        </dgm:pt>
-        <dgm:pt modelId="13">
-          <dgm:prSet phldr="1"/>
-        </dgm:pt>
-      </dgm:ptLst>
-      <dgm:cxnLst>
-        <dgm:cxn modelId="2" srcId="0" destId="1" srcOrd="0" destOrd="0"/>
-        <dgm:cxn modelId="3" srcId="1" destId="11" srcOrd="0" destOrd="0"/>
-        <dgm:cxn modelId="4" srcId="1" destId="12" srcOrd="1" destOrd="0"/>
-        <dgm:cxn modelId="5" srcId="1" destId="13" srcOrd="2" destOrd="0"/>
-      </dgm:cxnLst>
-      <dgm:bg/>
-      <dgm:whole/>
-    </dgm:dataModel>
-  </dgm:sampData>
-  <dgm:styleData>
-    <dgm:dataModel>
-      <dgm:ptLst>
-        <dgm:pt modelId="0" type="doc"/>
-        <dgm:pt modelId="1">
-          <dgm:prSet phldr="1"/>
-        </dgm:pt>
-        <dgm:pt modelId="11">
-          <dgm:prSet phldr="1"/>
-        </dgm:pt>
-        <dgm:pt modelId="12">
-          <dgm:prSet phldr="1"/>
-        </dgm:pt>
-      </dgm:ptLst>
-      <dgm:cxnLst>
-        <dgm:cxn modelId="2" srcId="0" destId="1" srcOrd="0" destOrd="0"/>
-        <dgm:cxn modelId="3" srcId="1" destId="11" srcOrd="0" destOrd="0"/>
-        <dgm:cxn modelId="4" srcId="1" destId="12" srcOrd="1" destOrd="0"/>
-      </dgm:cxnLst>
-      <dgm:bg/>
-      <dgm:whole/>
-    </dgm:dataModel>
-  </dgm:styleData>
-  <dgm:clrData>
-    <dgm:dataModel>
-      <dgm:ptLst>
-        <dgm:pt modelId="0" type="doc"/>
-        <dgm:pt modelId="1">
-          <dgm:prSet phldr="1"/>
-        </dgm:pt>
-        <dgm:pt modelId="11">
-          <dgm:prSet phldr="1"/>
-        </dgm:pt>
-        <dgm:pt modelId="12">
-          <dgm:prSet phldr="1"/>
-        </dgm:pt>
-      </dgm:ptLst>
-      <dgm:cxnLst>
-        <dgm:cxn modelId="2" srcId="0" destId="1" srcOrd="0" destOrd="0"/>
-        <dgm:cxn modelId="3" srcId="1" destId="11" srcOrd="0" destOrd="0"/>
-        <dgm:cxn modelId="4" srcId="1" destId="12" srcOrd="1" destOrd="0"/>
-      </dgm:cxnLst>
-      <dgm:bg/>
-      <dgm:whole/>
-    </dgm:dataModel>
-  </dgm:clrData>
-  <dgm:layoutNode name="vert0">
-    <dgm:varLst>
-      <dgm:dir/>
-      <dgm:animOne val="branch"/>
-      <dgm:animLvl val="lvl"/>
-    </dgm:varLst>
-    <dgm:choose name="Name0">
-      <dgm:if name="Name1" func="var" arg="dir" op="equ" val="norm">
-        <dgm:alg type="lin">
-          <dgm:param type="linDir" val="fromT"/>
-          <dgm:param type="nodeHorzAlign" val="l"/>
-        </dgm:alg>
-      </dgm:if>
-      <dgm:else name="Name2">
-        <dgm:alg type="lin">
-          <dgm:param type="linDir" val="fromT"/>
-          <dgm:param type="nodeHorzAlign" val="r"/>
-        </dgm:alg>
-      </dgm:else>
-    </dgm:choose>
-    <dgm:shape xmlns:r="http://schemas.openxmlformats.org/officeDocument/2006/relationships" r:blip="">
-      <dgm:adjLst/>
-    </dgm:shape>
-    <dgm:presOf/>
-    <dgm:constrLst>
-      <dgm:constr type="w" for="ch" forName="horz1" refType="w"/>
-      <dgm:constr type="h" for="ch" forName="horz1" refType="h"/>
-      <dgm:constr type="h" for="des" forName="vert1" refType="h"/>
-      <dgm:constr type="h" for="des" forName="tx1" refType="h"/>
-      <dgm:constr type="h" for="des" forName="horz2" refType="h"/>
-      <dgm:constr type="h" for="des" forName="vert2" refType="h"/>
-      <dgm:constr type="h" for="des" forName="horz3" refType="h"/>
-      <dgm:constr type="h" for="des" forName="vert3" refType="h"/>
-      <dgm:constr type="h" for="des" forName="horz4" refType="h"/>
-      <dgm:constr type="h" for="des" ptType="node" refType="h"/>
-      <dgm:constr type="primFontSz" for="des" forName="tx1" op="equ" val="65"/>
-      <dgm:constr type="primFontSz" for="des" forName="tx2" op="equ" val="65"/>
-      <dgm:constr type="primFontSz" for="des" forName="tx3" op="equ" val="65"/>
-      <dgm:constr type="primFontSz" for="des" forName="tx4" op="equ" val="65"/>
-      <dgm:constr type="w" for="des" forName="thickLine" refType="w"/>
-      <dgm:constr type="h" for="des" forName="thickLine"/>
-      <dgm:constr type="h" for="des" forName="thinLine1"/>
-      <dgm:constr type="h" for="des" forName="thinLine2b"/>
-      <dgm:constr type="h" for="des" forName="thinLine3"/>
-      <dgm:constr type="h" for="des" forName="vertSpace2a" refType="h" fact="0.05"/>
-      <dgm:constr type="h" for="des" forName="vertSpace2b" refType="h" refFor="des" refForName="vertSpace2a"/>
-    </dgm:constrLst>
-    <dgm:forEach name="Name3" axis="ch" ptType="node">
-      <dgm:layoutNode name="thickLine" styleLbl="alignNode1">
-        <dgm:alg type="sp"/>
-        <dgm:shape xmlns:r="http://schemas.openxmlformats.org/officeDocument/2006/relationships" type="line" r:blip="">
-          <dgm:adjLst/>
-        </dgm:shape>
-        <dgm:presOf/>
-      </dgm:layoutNode>
-      <dgm:layoutNode name="horz1">
-        <dgm:choose name="Name4">
-          <dgm:if name="Name5" func="var" arg="dir" op="equ" val="norm">
-            <dgm:alg type="lin">
-              <dgm:param type="linDir" val="fromL"/>
-              <dgm:param type="nodeVertAlign" val="t"/>
-            </dgm:alg>
-          </dgm:if>
-          <dgm:else name="Name6">
-            <dgm:alg type="lin">
-              <dgm:param type="linDir" val="fromR"/>
-              <dgm:param type="nodeVertAlign" val="t"/>
-            </dgm:alg>
-          </dgm:else>
-        </dgm:choose>
-        <dgm:shape xmlns:r="http://schemas.openxmlformats.org/officeDocument/2006/relationships" r:blip="">
-          <dgm:adjLst/>
-        </dgm:shape>
-        <dgm:presOf/>
-        <dgm:choose name="Name7">
-          <dgm:if name="Name8" axis="root des" func="maxDepth" op="equ" val="1">
-            <dgm:constrLst>
-              <dgm:constr type="w" for="ch" forName="tx1" refType="w"/>
-            </dgm:constrLst>
-          </dgm:if>
-          <dgm:if name="Name9" axis="root des" func="maxDepth" op="equ" val="2">
-            <dgm:constrLst>
-              <dgm:constr type="w" for="ch" forName="tx1" refType="w" fact="0.2"/>
-              <dgm:constr type="w" for="des" forName="tx2" refType="w" fact="0.785"/>
-              <dgm:constr type="w" for="des" forName="horzSpace2" refType="w" fact="0.015"/>
-              <dgm:constr type="w" for="des" forName="thinLine2b" refType="w" fact="0.8"/>
-            </dgm:constrLst>
-          </dgm:if>
-          <dgm:if name="Name10" axis="root des" func="maxDepth" op="equ" val="3">
-            <dgm:constrLst>
-              <dgm:constr type="w" for="ch" forName="tx1" refType="w" fact="0.2"/>
-              <dgm:constr type="w" for="des" forName="tx2" refType="w" fact="0.385"/>
-              <dgm:constr type="w" for="des" forName="tx3" refType="w" fact="0.385"/>
-              <dgm:constr type="w" for="des" forName="horzSpace2" refType="w" fact="0.015"/>
-              <dgm:constr type="w" for="des" forName="horzSpace3" refType="w" fact="0.015"/>
-              <dgm:constr type="w" for="des" forName="thinLine2b" refType="w" fact="0.8"/>
-              <dgm:constr type="w" for="des" forName="thinLine3" refType="w" fact="0.385"/>
-            </dgm:constrLst>
-          </dgm:if>
-          <dgm:if name="Name11" axis="root des" func="maxDepth" op="gte" val="4">
-            <dgm:constrLst>
-              <dgm:constr type="w" for="ch" forName="tx1" refType="w" fact="0.2"/>
-              <dgm:constr type="w" for="des" forName="tx2" refType="w" fact="0.2516"/>
-              <dgm:constr type="w" for="des" forName="tx3" refType="w" fact="0.2516"/>
-              <dgm:constr type="w" for="des" forName="tx4" refType="w" fact="0.2516"/>
-              <dgm:constr type="w" for="des" forName="horzSpace2" refType="w" fact="0.015"/>
-              <dgm:constr type="w" for="des" forName="horzSpace3" refType="w" fact="0.015"/>
-              <dgm:constr type="w" for="des" forName="horzSpace4" refType="w" fact="0.015"/>
-              <dgm:constr type="w" for="des" forName="thinLine2b" refType="w" fact="0.8"/>
-              <dgm:constr type="w" for="des" forName="thinLine3" refType="w" fact="0.5332"/>
-            </dgm:constrLst>
-          </dgm:if>
-          <dgm:else name="Name12"/>
-        </dgm:choose>
-        <dgm:layoutNode name="tx1" styleLbl="revTx">
-          <dgm:alg type="tx">
-            <dgm:param type="parTxLTRAlign" val="l"/>
-            <dgm:param type="parTxRTLAlign" val="r"/>
-            <dgm:param type="txAnchorVert" val="t"/>
-          </dgm:alg>
-          <dgm:shape xmlns:r="http://schemas.openxmlformats.org/officeDocument/2006/relationships" type="rect" r:blip="">
-            <dgm:adjLst/>
-          </dgm:shape>
-          <dgm:presOf axis="self"/>
-          <dgm:constrLst>
-            <dgm:constr type="tMarg" refType="primFontSz" fact="0.3"/>
-            <dgm:constr type="bMarg" refType="primFontSz" fact="0.3"/>
-            <dgm:constr type="lMarg" refType="primFontSz" fact="0.3"/>
-            <dgm:constr type="rMarg" refType="primFontSz" fact="0.3"/>
-          </dgm:constrLst>
-          <dgm:ruleLst>
-            <dgm:rule type="primFontSz" val="5" fact="NaN" max="NaN"/>
-          </dgm:ruleLst>
-        </dgm:layoutNode>
-        <dgm:layoutNode name="vert1">
-          <dgm:choose name="Name13">
-            <dgm:if name="Name14" func="var" arg="dir" op="equ" val="norm">
-              <dgm:alg type="lin">
-                <dgm:param type="linDir" val="fromT"/>
-                <dgm:param type="nodeHorzAlign" val="l"/>
-              </dgm:alg>
-            </dgm:if>
-            <dgm:else name="Name15">
-              <dgm:alg type="lin">
-                <dgm:param type="linDir" val="fromT"/>
-                <dgm:param type="nodeHorzAlign" val="r"/>
-              </dgm:alg>
-            </dgm:else>
-          </dgm:choose>
-          <dgm:shape xmlns:r="http://schemas.openxmlformats.org/officeDocument/2006/relationships" r:blip="">
-            <dgm:adjLst/>
-          </dgm:shape>
-          <dgm:presOf/>
-          <dgm:forEach name="Name16" axis="ch" ptType="node">
-            <dgm:choose name="Name17">
-              <dgm:if name="Name18" axis="self" ptType="node" func="pos" op="equ" val="1">
-                <dgm:layoutNode name="vertSpace2a">
-                  <dgm:alg type="sp"/>
-                  <dgm:shape xmlns:r="http://schemas.openxmlformats.org/officeDocument/2006/relationships" r:blip="">
-                    <dgm:adjLst/>
-                  </dgm:shape>
-                  <dgm:presOf/>
-                </dgm:layoutNode>
-              </dgm:if>
-              <dgm:else name="Name19"/>
-            </dgm:choose>
-            <dgm:layoutNode name="horz2">
-              <dgm:choose name="Name20">
-                <dgm:if name="Name21" func="var" arg="dir" op="equ" val="norm">
-                  <dgm:alg type="lin">
-                    <dgm:param type="linDir" val="fromL"/>
-                    <dgm:param type="nodeVertAlign" val="t"/>
-                  </dgm:alg>
-                </dgm:if>
-                <dgm:else name="Name22">
-                  <dgm:alg type="lin">
-                    <dgm:param type="linDir" val="fromR"/>
-                    <dgm:param type="nodeVertAlign" val="t"/>
-                  </dgm:alg>
-                </dgm:else>
-              </dgm:choose>
-              <dgm:shape xmlns:r="http://schemas.openxmlformats.org/officeDocument/2006/relationships" r:blip="">
-                <dgm:adjLst/>
-              </dgm:shape>
-              <dgm:presOf/>
-              <dgm:layoutNode name="horzSpace2">
-                <dgm:alg type="sp"/>
-                <dgm:shape xmlns:r="http://schemas.openxmlformats.org/officeDocument/2006/relationships" r:blip="">
-                  <dgm:adjLst/>
-                </dgm:shape>
-                <dgm:presOf/>
-              </dgm:layoutNode>
-              <dgm:layoutNode name="tx2" styleLbl="revTx">
-                <dgm:alg type="tx">
-                  <dgm:param type="parTxLTRAlign" val="l"/>
-                  <dgm:param type="parTxRTLAlign" val="r"/>
-                  <dgm:param type="txAnchorVert" val="t"/>
-                </dgm:alg>
-                <dgm:shape xmlns:r="http://schemas.openxmlformats.org/officeDocument/2006/relationships" type="rect" r:blip="">
-                  <dgm:adjLst/>
-                </dgm:shape>
-                <dgm:presOf axis="self"/>
-                <dgm:constrLst>
-                  <dgm:constr type="tMarg" refType="primFontSz" fact="0.3"/>
-                  <dgm:constr type="bMarg" refType="primFontSz" fact="0.3"/>
-                  <dgm:constr type="lMarg" refType="primFontSz" fact="0.3"/>
-                  <dgm:constr type="rMarg" refType="primFontSz" fact="0.3"/>
-                </dgm:constrLst>
-                <dgm:ruleLst>
-                  <dgm:rule type="primFontSz" val="5" fact="NaN" max="NaN"/>
-                </dgm:ruleLst>
-              </dgm:layoutNode>
-              <dgm:layoutNode name="vert2">
-                <dgm:choose name="Name23">
-                  <dgm:if name="Name24" func="var" arg="dir" op="equ" val="norm">
-                    <dgm:alg type="lin">
-                      <dgm:param type="linDir" val="fromT"/>
-                      <dgm:param type="nodeHorzAlign" val="l"/>
-                    </dgm:alg>
-                  </dgm:if>
-                  <dgm:else name="Name25">
-                    <dgm:alg type="lin">
-                      <dgm:param type="linDir" val="fromT"/>
-                      <dgm:param type="nodeHorzAlign" val="r"/>
-                    </dgm:alg>
-                  </dgm:else>
-                </dgm:choose>
-                <dgm:shape xmlns:r="http://schemas.openxmlformats.org/officeDocument/2006/relationships" r:blip="">
-                  <dgm:adjLst/>
-                </dgm:shape>
-                <dgm:presOf/>
-                <dgm:forEach name="Name26" axis="ch" ptType="node">
-                  <dgm:layoutNode name="horz3">
-                    <dgm:choose name="Name27">
-                      <dgm:if name="Name28" func="var" arg="dir" op="equ" val="norm">
-                        <dgm:alg type="lin">
-                          <dgm:param type="linDir" val="fromL"/>
-                          <dgm:param type="nodeVertAlign" val="t"/>
-                        </dgm:alg>
-                      </dgm:if>
-                      <dgm:else name="Name29">
-                        <dgm:alg type="lin">
-                          <dgm:param type="linDir" val="fromR"/>
-                          <dgm:param type="nodeVertAlign" val="t"/>
-                        </dgm:alg>
-                      </dgm:else>
-                    </dgm:choose>
-                    <dgm:shape xmlns:r="http://schemas.openxmlformats.org/officeDocument/2006/relationships" r:blip="">
-                      <dgm:adjLst/>
-                    </dgm:shape>
-                    <dgm:presOf/>
-                    <dgm:layoutNode name="horzSpace3">
-                      <dgm:alg type="sp"/>
-                      <dgm:shape xmlns:r="http://schemas.openxmlformats.org/officeDocument/2006/relationships" r:blip="">
-                        <dgm:adjLst/>
-                      </dgm:shape>
-                      <dgm:presOf/>
-                    </dgm:layoutNode>
-                    <dgm:layoutNode name="tx3" styleLbl="revTx">
-                      <dgm:alg type="tx">
-                        <dgm:param type="parTxLTRAlign" val="l"/>
-                        <dgm:param type="parTxRTLAlign" val="r"/>
-                        <dgm:param type="txAnchorVert" val="t"/>
-                      </dgm:alg>
-                      <dgm:shape xmlns:r="http://schemas.openxmlformats.org/officeDocument/2006/relationships" type="rect" r:blip="">
-                        <dgm:adjLst/>
-                      </dgm:shape>
-                      <dgm:presOf axis="self"/>
-                      <dgm:constrLst>
-                        <dgm:constr type="tMarg" refType="primFontSz" fact="0.3"/>
-                        <dgm:constr type="bMarg" refType="primFontSz" fact="0.3"/>
-                        <dgm:constr type="lMarg" refType="primFontSz" fact="0.3"/>
-                        <dgm:constr type="rMarg" refType="primFontSz" fact="0.3"/>
-                      </dgm:constrLst>
-                      <dgm:ruleLst>
-                        <dgm:rule type="primFontSz" val="5" fact="NaN" max="NaN"/>
-                      </dgm:ruleLst>
-                    </dgm:layoutNode>
-                    <dgm:layoutNode name="vert3">
-                      <dgm:choose name="Name30">
-                        <dgm:if name="Name31" func="var" arg="dir" op="equ" val="norm">
-                          <dgm:alg type="lin">
-                            <dgm:param type="linDir" val="fromT"/>
-                            <dgm:param type="nodeHorzAlign" val="l"/>
-                          </dgm:alg>
-                        </dgm:if>
-                        <dgm:else name="Name32">
-                          <dgm:alg type="lin">
-                            <dgm:param type="linDir" val="fromT"/>
-                            <dgm:param type="nodeHorzAlign" val="r"/>
-                          </dgm:alg>
-                        </dgm:else>
-                      </dgm:choose>
-                      <dgm:shape xmlns:r="http://schemas.openxmlformats.org/officeDocument/2006/relationships" r:blip="">
-                        <dgm:adjLst/>
-                      </dgm:shape>
-                      <dgm:presOf/>
-                      <dgm:forEach name="Name33" axis="ch" ptType="node">
-                        <dgm:layoutNode name="horz4">
-                          <dgm:choose name="Name34">
-                            <dgm:if name="Name35" func="var" arg="dir" op="equ" val="norm">
-                              <dgm:alg type="lin">
-                                <dgm:param type="linDir" val="fromL"/>
-                                <dgm:param type="nodeVertAlign" val="t"/>
-                              </dgm:alg>
-                            </dgm:if>
-                            <dgm:else name="Name36">
-                              <dgm:alg type="lin">
-                                <dgm:param type="linDir" val="fromR"/>
-                                <dgm:param type="nodeVertAlign" val="t"/>
-                              </dgm:alg>
-                            </dgm:else>
-                          </dgm:choose>
-                          <dgm:shape xmlns:r="http://schemas.openxmlformats.org/officeDocument/2006/relationships" r:blip="">
-                            <dgm:adjLst/>
-                          </dgm:shape>
-                          <dgm:presOf/>
-                          <dgm:layoutNode name="horzSpace4">
-                            <dgm:alg type="sp"/>
-                            <dgm:shape xmlns:r="http://schemas.openxmlformats.org/officeDocument/2006/relationships" r:blip="">
-                              <dgm:adjLst/>
-                            </dgm:shape>
-                            <dgm:presOf/>
-                          </dgm:layoutNode>
-                          <dgm:layoutNode name="tx4" styleLbl="revTx">
-                            <dgm:varLst>
-                              <dgm:bulletEnabled val="1"/>
-                            </dgm:varLst>
-                            <dgm:alg type="tx">
-                              <dgm:param type="parTxLTRAlign" val="l"/>
-                              <dgm:param type="parTxRTLAlign" val="r"/>
-                              <dgm:param type="txAnchorVert" val="t"/>
-                            </dgm:alg>
-                            <dgm:shape xmlns:r="http://schemas.openxmlformats.org/officeDocument/2006/relationships" type="rect" r:blip="">
-                              <dgm:adjLst/>
-                            </dgm:shape>
-                            <dgm:presOf axis="desOrSelf" ptType="node"/>
-                            <dgm:constrLst>
-                              <dgm:constr type="tMarg" refType="primFontSz" fact="0.3"/>
-                              <dgm:constr type="bMarg" refType="primFontSz" fact="0.3"/>
-                              <dgm:constr type="lMarg" refType="primFontSz" fact="0.3"/>
-                              <dgm:constr type="rMarg" refType="primFontSz" fact="0.3"/>
-                            </dgm:constrLst>
-                            <dgm:ruleLst>
-                              <dgm:rule type="primFontSz" val="5" fact="NaN" max="NaN"/>
-                            </dgm:ruleLst>
-                          </dgm:layoutNode>
-                        </dgm:layoutNode>
-                      </dgm:forEach>
-                    </dgm:layoutNode>
-                  </dgm:layoutNode>
-                  <dgm:forEach name="Name37" axis="followSib" ptType="sibTrans" cnt="1">
-                    <dgm:layoutNode name="thinLine3" styleLbl="callout">
-                      <dgm:alg type="sp"/>
-                      <dgm:shape xmlns:r="http://schemas.openxmlformats.org/officeDocument/2006/relationships" type="line" r:blip="">
-                        <dgm:adjLst/>
-                      </dgm:shape>
-                      <dgm:presOf/>
-                    </dgm:layoutNode>
-                  </dgm:forEach>
-                </dgm:forEach>
-              </dgm:layoutNode>
-            </dgm:layoutNode>
-            <dgm:layoutNode name="thinLine2b" styleLbl="callout">
-              <dgm:alg type="sp"/>
-              <dgm:shape xmlns:r="http://schemas.openxmlformats.org/officeDocument/2006/relationships" type="line" r:blip="">
-                <dgm:adjLst/>
-              </dgm:shape>
-              <dgm:presOf/>
-            </dgm:layoutNode>
-            <dgm:layoutNode name="vertSpace2b">
-              <dgm:alg type="sp"/>
-              <dgm:shape xmlns:r="http://schemas.openxmlformats.org/officeDocument/2006/relationships" r:blip="">
-                <dgm:adjLst/>
-              </dgm:shape>
-              <dgm:presOf/>
-            </dgm:layoutNode>
-          </dgm:forEach>
-        </dgm:layoutNode>
-      </dgm:layoutNode>
-    </dgm:forEach>
-  </dgm:layoutNode>
-</dgm:layoutDef>
-</file>
-
 <file path=ppt/diagrams/quickStyle1.xml><?xml version="1.0" encoding="utf-8"?>
 <dgm:styleDef xmlns:dgm="http://schemas.openxmlformats.org/drawingml/2006/diagram" xmlns:a="http://schemas.openxmlformats.org/drawingml/2006/main" uniqueId="urn:microsoft.com/office/officeart/2005/8/quickstyle/simple1">
   <dgm:title val=""/>
@@ -7765,1040 +5773,6 @@
 </file>
 
 <file path=ppt/diagrams/quickStyle2.xml><?xml version="1.0" encoding="utf-8"?>
-<dgm:styleDef xmlns:dgm="http://schemas.openxmlformats.org/drawingml/2006/diagram" xmlns:a="http://schemas.openxmlformats.org/drawingml/2006/main" uniqueId="urn:microsoft.com/office/officeart/2005/8/quickstyle/simple1">
-  <dgm:title val=""/>
-  <dgm:desc val=""/>
-  <dgm:catLst>
-    <dgm:cat type="simple" pri="10100"/>
-  </dgm:catLst>
-  <dgm:scene3d>
-    <a:camera prst="orthographicFront"/>
-    <a:lightRig rig="threePt" dir="t"/>
-  </dgm:scene3d>
-  <dgm:styleLbl name="node0">
-    <dgm:scene3d>
-      <a:camera prst="orthographicFront"/>
-      <a:lightRig rig="threePt" dir="t"/>
-    </dgm:scene3d>
-    <dgm:sp3d/>
-    <dgm:txPr/>
-    <dgm:style>
-      <a:lnRef idx="2">
-        <a:scrgbClr r="0" g="0" b="0"/>
-      </a:lnRef>
-      <a:fillRef idx="1">
-        <a:scrgbClr r="0" g="0" b="0"/>
-      </a:fillRef>
-      <a:effectRef idx="0">
-        <a:scrgbClr r="0" g="0" b="0"/>
-      </a:effectRef>
-      <a:fontRef idx="minor">
-        <a:schemeClr val="lt1"/>
-      </a:fontRef>
-    </dgm:style>
-  </dgm:styleLbl>
-  <dgm:styleLbl name="lnNode1">
-    <dgm:scene3d>
-      <a:camera prst="orthographicFront"/>
-      <a:lightRig rig="threePt" dir="t"/>
-    </dgm:scene3d>
-    <dgm:sp3d/>
-    <dgm:txPr/>
-    <dgm:style>
-      <a:lnRef idx="2">
-        <a:scrgbClr r="0" g="0" b="0"/>
-      </a:lnRef>
-      <a:fillRef idx="1">
-        <a:scrgbClr r="0" g="0" b="0"/>
-      </a:fillRef>
-      <a:effectRef idx="0">
-        <a:scrgbClr r="0" g="0" b="0"/>
-      </a:effectRef>
-      <a:fontRef idx="minor">
-        <a:schemeClr val="lt1"/>
-      </a:fontRef>
-    </dgm:style>
-  </dgm:styleLbl>
-  <dgm:styleLbl name="vennNode1">
-    <dgm:scene3d>
-      <a:camera prst="orthographicFront"/>
-      <a:lightRig rig="threePt" dir="t"/>
-    </dgm:scene3d>
-    <dgm:sp3d/>
-    <dgm:txPr/>
-    <dgm:style>
-      <a:lnRef idx="2">
-        <a:scrgbClr r="0" g="0" b="0"/>
-      </a:lnRef>
-      <a:fillRef idx="1">
-        <a:scrgbClr r="0" g="0" b="0"/>
-      </a:fillRef>
-      <a:effectRef idx="0">
-        <a:scrgbClr r="0" g="0" b="0"/>
-      </a:effectRef>
-      <a:fontRef idx="minor">
-        <a:schemeClr val="tx1"/>
-      </a:fontRef>
-    </dgm:style>
-  </dgm:styleLbl>
-  <dgm:styleLbl name="alignNode1">
-    <dgm:scene3d>
-      <a:camera prst="orthographicFront"/>
-      <a:lightRig rig="threePt" dir="t"/>
-    </dgm:scene3d>
-    <dgm:sp3d/>
-    <dgm:txPr/>
-    <dgm:style>
-      <a:lnRef idx="2">
-        <a:scrgbClr r="0" g="0" b="0"/>
-      </a:lnRef>
-      <a:fillRef idx="1">
-        <a:scrgbClr r="0" g="0" b="0"/>
-      </a:fillRef>
-      <a:effectRef idx="0">
-        <a:scrgbClr r="0" g="0" b="0"/>
-      </a:effectRef>
-      <a:fontRef idx="minor">
-        <a:schemeClr val="lt1"/>
-      </a:fontRef>
-    </dgm:style>
-  </dgm:styleLbl>
-  <dgm:styleLbl name="node1">
-    <dgm:scene3d>
-      <a:camera prst="orthographicFront"/>
-      <a:lightRig rig="threePt" dir="t"/>
-    </dgm:scene3d>
-    <dgm:sp3d/>
-    <dgm:txPr/>
-    <dgm:style>
-      <a:lnRef idx="2">
-        <a:scrgbClr r="0" g="0" b="0"/>
-      </a:lnRef>
-      <a:fillRef idx="1">
-        <a:scrgbClr r="0" g="0" b="0"/>
-      </a:fillRef>
-      <a:effectRef idx="0">
-        <a:scrgbClr r="0" g="0" b="0"/>
-      </a:effectRef>
-      <a:fontRef idx="minor">
-        <a:schemeClr val="lt1"/>
-      </a:fontRef>
-    </dgm:style>
-  </dgm:styleLbl>
-  <dgm:styleLbl name="node2">
-    <dgm:scene3d>
-      <a:camera prst="orthographicFront"/>
-      <a:lightRig rig="threePt" dir="t"/>
-    </dgm:scene3d>
-    <dgm:sp3d/>
-    <dgm:txPr/>
-    <dgm:style>
-      <a:lnRef idx="2">
-        <a:scrgbClr r="0" g="0" b="0"/>
-      </a:lnRef>
-      <a:fillRef idx="1">
-        <a:scrgbClr r="0" g="0" b="0"/>
-      </a:fillRef>
-      <a:effectRef idx="0">
-        <a:scrgbClr r="0" g="0" b="0"/>
-      </a:effectRef>
-      <a:fontRef idx="minor">
-        <a:schemeClr val="lt1"/>
-      </a:fontRef>
-    </dgm:style>
-  </dgm:styleLbl>
-  <dgm:styleLbl name="node3">
-    <dgm:scene3d>
-      <a:camera prst="orthographicFront"/>
-      <a:lightRig rig="threePt" dir="t"/>
-    </dgm:scene3d>
-    <dgm:sp3d/>
-    <dgm:txPr/>
-    <dgm:style>
-      <a:lnRef idx="2">
-        <a:scrgbClr r="0" g="0" b="0"/>
-      </a:lnRef>
-      <a:fillRef idx="1">
-        <a:scrgbClr r="0" g="0" b="0"/>
-      </a:fillRef>
-      <a:effectRef idx="0">
-        <a:scrgbClr r="0" g="0" b="0"/>
-      </a:effectRef>
-      <a:fontRef idx="minor">
-        <a:schemeClr val="lt1"/>
-      </a:fontRef>
-    </dgm:style>
-  </dgm:styleLbl>
-  <dgm:styleLbl name="node4">
-    <dgm:scene3d>
-      <a:camera prst="orthographicFront"/>
-      <a:lightRig rig="threePt" dir="t"/>
-    </dgm:scene3d>
-    <dgm:sp3d/>
-    <dgm:txPr/>
-    <dgm:style>
-      <a:lnRef idx="2">
-        <a:scrgbClr r="0" g="0" b="0"/>
-      </a:lnRef>
-      <a:fillRef idx="1">
-        <a:scrgbClr r="0" g="0" b="0"/>
-      </a:fillRef>
-      <a:effectRef idx="0">
-        <a:scrgbClr r="0" g="0" b="0"/>
-      </a:effectRef>
-      <a:fontRef idx="minor">
-        <a:schemeClr val="lt1"/>
-      </a:fontRef>
-    </dgm:style>
-  </dgm:styleLbl>
-  <dgm:styleLbl name="fgImgPlace1">
-    <dgm:scene3d>
-      <a:camera prst="orthographicFront"/>
-      <a:lightRig rig="threePt" dir="t"/>
-    </dgm:scene3d>
-    <dgm:sp3d/>
-    <dgm:txPr/>
-    <dgm:style>
-      <a:lnRef idx="2">
-        <a:scrgbClr r="0" g="0" b="0"/>
-      </a:lnRef>
-      <a:fillRef idx="1">
-        <a:scrgbClr r="0" g="0" b="0"/>
-      </a:fillRef>
-      <a:effectRef idx="0">
-        <a:scrgbClr r="0" g="0" b="0"/>
-      </a:effectRef>
-      <a:fontRef idx="minor"/>
-    </dgm:style>
-  </dgm:styleLbl>
-  <dgm:styleLbl name="alignImgPlace1">
-    <dgm:scene3d>
-      <a:camera prst="orthographicFront"/>
-      <a:lightRig rig="threePt" dir="t"/>
-    </dgm:scene3d>
-    <dgm:sp3d/>
-    <dgm:txPr/>
-    <dgm:style>
-      <a:lnRef idx="2">
-        <a:scrgbClr r="0" g="0" b="0"/>
-      </a:lnRef>
-      <a:fillRef idx="1">
-        <a:scrgbClr r="0" g="0" b="0"/>
-      </a:fillRef>
-      <a:effectRef idx="0">
-        <a:scrgbClr r="0" g="0" b="0"/>
-      </a:effectRef>
-      <a:fontRef idx="minor"/>
-    </dgm:style>
-  </dgm:styleLbl>
-  <dgm:styleLbl name="bgImgPlace1">
-    <dgm:scene3d>
-      <a:camera prst="orthographicFront"/>
-      <a:lightRig rig="threePt" dir="t"/>
-    </dgm:scene3d>
-    <dgm:sp3d/>
-    <dgm:txPr/>
-    <dgm:style>
-      <a:lnRef idx="2">
-        <a:scrgbClr r="0" g="0" b="0"/>
-      </a:lnRef>
-      <a:fillRef idx="1">
-        <a:scrgbClr r="0" g="0" b="0"/>
-      </a:fillRef>
-      <a:effectRef idx="0">
-        <a:scrgbClr r="0" g="0" b="0"/>
-      </a:effectRef>
-      <a:fontRef idx="minor"/>
-    </dgm:style>
-  </dgm:styleLbl>
-  <dgm:styleLbl name="sibTrans2D1">
-    <dgm:scene3d>
-      <a:camera prst="orthographicFront"/>
-      <a:lightRig rig="threePt" dir="t"/>
-    </dgm:scene3d>
-    <dgm:sp3d/>
-    <dgm:txPr/>
-    <dgm:style>
-      <a:lnRef idx="0">
-        <a:scrgbClr r="0" g="0" b="0"/>
-      </a:lnRef>
-      <a:fillRef idx="1">
-        <a:scrgbClr r="0" g="0" b="0"/>
-      </a:fillRef>
-      <a:effectRef idx="0">
-        <a:scrgbClr r="0" g="0" b="0"/>
-      </a:effectRef>
-      <a:fontRef idx="minor">
-        <a:schemeClr val="lt1"/>
-      </a:fontRef>
-    </dgm:style>
-  </dgm:styleLbl>
-  <dgm:styleLbl name="fgSibTrans2D1">
-    <dgm:scene3d>
-      <a:camera prst="orthographicFront"/>
-      <a:lightRig rig="threePt" dir="t"/>
-    </dgm:scene3d>
-    <dgm:sp3d/>
-    <dgm:txPr/>
-    <dgm:style>
-      <a:lnRef idx="0">
-        <a:scrgbClr r="0" g="0" b="0"/>
-      </a:lnRef>
-      <a:fillRef idx="1">
-        <a:scrgbClr r="0" g="0" b="0"/>
-      </a:fillRef>
-      <a:effectRef idx="0">
-        <a:scrgbClr r="0" g="0" b="0"/>
-      </a:effectRef>
-      <a:fontRef idx="minor">
-        <a:schemeClr val="lt1"/>
-      </a:fontRef>
-    </dgm:style>
-  </dgm:styleLbl>
-  <dgm:styleLbl name="bgSibTrans2D1">
-    <dgm:scene3d>
-      <a:camera prst="orthographicFront"/>
-      <a:lightRig rig="threePt" dir="t"/>
-    </dgm:scene3d>
-    <dgm:sp3d/>
-    <dgm:txPr/>
-    <dgm:style>
-      <a:lnRef idx="0">
-        <a:scrgbClr r="0" g="0" b="0"/>
-      </a:lnRef>
-      <a:fillRef idx="1">
-        <a:scrgbClr r="0" g="0" b="0"/>
-      </a:fillRef>
-      <a:effectRef idx="0">
-        <a:scrgbClr r="0" g="0" b="0"/>
-      </a:effectRef>
-      <a:fontRef idx="minor">
-        <a:schemeClr val="lt1"/>
-      </a:fontRef>
-    </dgm:style>
-  </dgm:styleLbl>
-  <dgm:styleLbl name="sibTrans1D1">
-    <dgm:scene3d>
-      <a:camera prst="orthographicFront"/>
-      <a:lightRig rig="threePt" dir="t"/>
-    </dgm:scene3d>
-    <dgm:sp3d/>
-    <dgm:txPr/>
-    <dgm:style>
-      <a:lnRef idx="1">
-        <a:scrgbClr r="0" g="0" b="0"/>
-      </a:lnRef>
-      <a:fillRef idx="0">
-        <a:scrgbClr r="0" g="0" b="0"/>
-      </a:fillRef>
-      <a:effectRef idx="0">
-        <a:scrgbClr r="0" g="0" b="0"/>
-      </a:effectRef>
-      <a:fontRef idx="minor"/>
-    </dgm:style>
-  </dgm:styleLbl>
-  <dgm:styleLbl name="callout">
-    <dgm:scene3d>
-      <a:camera prst="orthographicFront"/>
-      <a:lightRig rig="threePt" dir="t"/>
-    </dgm:scene3d>
-    <dgm:sp3d/>
-    <dgm:txPr/>
-    <dgm:style>
-      <a:lnRef idx="2">
-        <a:scrgbClr r="0" g="0" b="0"/>
-      </a:lnRef>
-      <a:fillRef idx="1">
-        <a:scrgbClr r="0" g="0" b="0"/>
-      </a:fillRef>
-      <a:effectRef idx="0">
-        <a:scrgbClr r="0" g="0" b="0"/>
-      </a:effectRef>
-      <a:fontRef idx="minor"/>
-    </dgm:style>
-  </dgm:styleLbl>
-  <dgm:styleLbl name="asst0">
-    <dgm:scene3d>
-      <a:camera prst="orthographicFront"/>
-      <a:lightRig rig="threePt" dir="t"/>
-    </dgm:scene3d>
-    <dgm:sp3d/>
-    <dgm:txPr/>
-    <dgm:style>
-      <a:lnRef idx="2">
-        <a:scrgbClr r="0" g="0" b="0"/>
-      </a:lnRef>
-      <a:fillRef idx="1">
-        <a:scrgbClr r="0" g="0" b="0"/>
-      </a:fillRef>
-      <a:effectRef idx="0">
-        <a:scrgbClr r="0" g="0" b="0"/>
-      </a:effectRef>
-      <a:fontRef idx="minor">
-        <a:schemeClr val="lt1"/>
-      </a:fontRef>
-    </dgm:style>
-  </dgm:styleLbl>
-  <dgm:styleLbl name="asst1">
-    <dgm:scene3d>
-      <a:camera prst="orthographicFront"/>
-      <a:lightRig rig="threePt" dir="t"/>
-    </dgm:scene3d>
-    <dgm:sp3d/>
-    <dgm:txPr/>
-    <dgm:style>
-      <a:lnRef idx="2">
-        <a:scrgbClr r="0" g="0" b="0"/>
-      </a:lnRef>
-      <a:fillRef idx="1">
-        <a:scrgbClr r="0" g="0" b="0"/>
-      </a:fillRef>
-      <a:effectRef idx="0">
-        <a:scrgbClr r="0" g="0" b="0"/>
-      </a:effectRef>
-      <a:fontRef idx="minor">
-        <a:schemeClr val="lt1"/>
-      </a:fontRef>
-    </dgm:style>
-  </dgm:styleLbl>
-  <dgm:styleLbl name="asst2">
-    <dgm:scene3d>
-      <a:camera prst="orthographicFront"/>
-      <a:lightRig rig="threePt" dir="t"/>
-    </dgm:scene3d>
-    <dgm:sp3d/>
-    <dgm:txPr/>
-    <dgm:style>
-      <a:lnRef idx="2">
-        <a:scrgbClr r="0" g="0" b="0"/>
-      </a:lnRef>
-      <a:fillRef idx="1">
-        <a:scrgbClr r="0" g="0" b="0"/>
-      </a:fillRef>
-      <a:effectRef idx="0">
-        <a:scrgbClr r="0" g="0" b="0"/>
-      </a:effectRef>
-      <a:fontRef idx="minor">
-        <a:schemeClr val="lt1"/>
-      </a:fontRef>
-    </dgm:style>
-  </dgm:styleLbl>
-  <dgm:styleLbl name="asst3">
-    <dgm:scene3d>
-      <a:camera prst="orthographicFront"/>
-      <a:lightRig rig="threePt" dir="t"/>
-    </dgm:scene3d>
-    <dgm:sp3d/>
-    <dgm:txPr/>
-    <dgm:style>
-      <a:lnRef idx="2">
-        <a:scrgbClr r="0" g="0" b="0"/>
-      </a:lnRef>
-      <a:fillRef idx="1">
-        <a:scrgbClr r="0" g="0" b="0"/>
-      </a:fillRef>
-      <a:effectRef idx="0">
-        <a:scrgbClr r="0" g="0" b="0"/>
-      </a:effectRef>
-      <a:fontRef idx="minor">
-        <a:schemeClr val="lt1"/>
-      </a:fontRef>
-    </dgm:style>
-  </dgm:styleLbl>
-  <dgm:styleLbl name="asst4">
-    <dgm:scene3d>
-      <a:camera prst="orthographicFront"/>
-      <a:lightRig rig="threePt" dir="t"/>
-    </dgm:scene3d>
-    <dgm:sp3d/>
-    <dgm:txPr/>
-    <dgm:style>
-      <a:lnRef idx="2">
-        <a:scrgbClr r="0" g="0" b="0"/>
-      </a:lnRef>
-      <a:fillRef idx="1">
-        <a:scrgbClr r="0" g="0" b="0"/>
-      </a:fillRef>
-      <a:effectRef idx="0">
-        <a:scrgbClr r="0" g="0" b="0"/>
-      </a:effectRef>
-      <a:fontRef idx="minor">
-        <a:schemeClr val="lt1"/>
-      </a:fontRef>
-    </dgm:style>
-  </dgm:styleLbl>
-  <dgm:styleLbl name="parChTrans2D1">
-    <dgm:scene3d>
-      <a:camera prst="orthographicFront"/>
-      <a:lightRig rig="threePt" dir="t"/>
-    </dgm:scene3d>
-    <dgm:sp3d/>
-    <dgm:txPr/>
-    <dgm:style>
-      <a:lnRef idx="2">
-        <a:scrgbClr r="0" g="0" b="0"/>
-      </a:lnRef>
-      <a:fillRef idx="1">
-        <a:scrgbClr r="0" g="0" b="0"/>
-      </a:fillRef>
-      <a:effectRef idx="0">
-        <a:scrgbClr r="0" g="0" b="0"/>
-      </a:effectRef>
-      <a:fontRef idx="minor">
-        <a:schemeClr val="lt1"/>
-      </a:fontRef>
-    </dgm:style>
-  </dgm:styleLbl>
-  <dgm:styleLbl name="parChTrans2D2">
-    <dgm:scene3d>
-      <a:camera prst="orthographicFront"/>
-      <a:lightRig rig="threePt" dir="t"/>
-    </dgm:scene3d>
-    <dgm:sp3d/>
-    <dgm:txPr/>
-    <dgm:style>
-      <a:lnRef idx="2">
-        <a:scrgbClr r="0" g="0" b="0"/>
-      </a:lnRef>
-      <a:fillRef idx="1">
-        <a:scrgbClr r="0" g="0" b="0"/>
-      </a:fillRef>
-      <a:effectRef idx="0">
-        <a:scrgbClr r="0" g="0" b="0"/>
-      </a:effectRef>
-      <a:fontRef idx="minor">
-        <a:schemeClr val="lt1"/>
-      </a:fontRef>
-    </dgm:style>
-  </dgm:styleLbl>
-  <dgm:styleLbl name="parChTrans2D3">
-    <dgm:scene3d>
-      <a:camera prst="orthographicFront"/>
-      <a:lightRig rig="threePt" dir="t"/>
-    </dgm:scene3d>
-    <dgm:sp3d/>
-    <dgm:txPr/>
-    <dgm:style>
-      <a:lnRef idx="2">
-        <a:scrgbClr r="0" g="0" b="0"/>
-      </a:lnRef>
-      <a:fillRef idx="1">
-        <a:scrgbClr r="0" g="0" b="0"/>
-      </a:fillRef>
-      <a:effectRef idx="0">
-        <a:scrgbClr r="0" g="0" b="0"/>
-      </a:effectRef>
-      <a:fontRef idx="minor">
-        <a:schemeClr val="lt1"/>
-      </a:fontRef>
-    </dgm:style>
-  </dgm:styleLbl>
-  <dgm:styleLbl name="parChTrans2D4">
-    <dgm:scene3d>
-      <a:camera prst="orthographicFront"/>
-      <a:lightRig rig="threePt" dir="t"/>
-    </dgm:scene3d>
-    <dgm:sp3d/>
-    <dgm:txPr/>
-    <dgm:style>
-      <a:lnRef idx="2">
-        <a:scrgbClr r="0" g="0" b="0"/>
-      </a:lnRef>
-      <a:fillRef idx="1">
-        <a:scrgbClr r="0" g="0" b="0"/>
-      </a:fillRef>
-      <a:effectRef idx="0">
-        <a:scrgbClr r="0" g="0" b="0"/>
-      </a:effectRef>
-      <a:fontRef idx="minor">
-        <a:schemeClr val="lt1"/>
-      </a:fontRef>
-    </dgm:style>
-  </dgm:styleLbl>
-  <dgm:styleLbl name="parChTrans1D1">
-    <dgm:scene3d>
-      <a:camera prst="orthographicFront"/>
-      <a:lightRig rig="threePt" dir="t"/>
-    </dgm:scene3d>
-    <dgm:sp3d/>
-    <dgm:txPr/>
-    <dgm:style>
-      <a:lnRef idx="2">
-        <a:scrgbClr r="0" g="0" b="0"/>
-      </a:lnRef>
-      <a:fillRef idx="0">
-        <a:scrgbClr r="0" g="0" b="0"/>
-      </a:fillRef>
-      <a:effectRef idx="0">
-        <a:scrgbClr r="0" g="0" b="0"/>
-      </a:effectRef>
-      <a:fontRef idx="minor"/>
-    </dgm:style>
-  </dgm:styleLbl>
-  <dgm:styleLbl name="parChTrans1D2">
-    <dgm:scene3d>
-      <a:camera prst="orthographicFront"/>
-      <a:lightRig rig="threePt" dir="t"/>
-    </dgm:scene3d>
-    <dgm:sp3d/>
-    <dgm:txPr/>
-    <dgm:style>
-      <a:lnRef idx="2">
-        <a:scrgbClr r="0" g="0" b="0"/>
-      </a:lnRef>
-      <a:fillRef idx="0">
-        <a:scrgbClr r="0" g="0" b="0"/>
-      </a:fillRef>
-      <a:effectRef idx="0">
-        <a:scrgbClr r="0" g="0" b="0"/>
-      </a:effectRef>
-      <a:fontRef idx="minor"/>
-    </dgm:style>
-  </dgm:styleLbl>
-  <dgm:styleLbl name="parChTrans1D3">
-    <dgm:scene3d>
-      <a:camera prst="orthographicFront"/>
-      <a:lightRig rig="threePt" dir="t"/>
-    </dgm:scene3d>
-    <dgm:sp3d/>
-    <dgm:txPr/>
-    <dgm:style>
-      <a:lnRef idx="2">
-        <a:scrgbClr r="0" g="0" b="0"/>
-      </a:lnRef>
-      <a:fillRef idx="0">
-        <a:scrgbClr r="0" g="0" b="0"/>
-      </a:fillRef>
-      <a:effectRef idx="0">
-        <a:scrgbClr r="0" g="0" b="0"/>
-      </a:effectRef>
-      <a:fontRef idx="minor"/>
-    </dgm:style>
-  </dgm:styleLbl>
-  <dgm:styleLbl name="parChTrans1D4">
-    <dgm:scene3d>
-      <a:camera prst="orthographicFront"/>
-      <a:lightRig rig="threePt" dir="t"/>
-    </dgm:scene3d>
-    <dgm:sp3d/>
-    <dgm:txPr/>
-    <dgm:style>
-      <a:lnRef idx="2">
-        <a:scrgbClr r="0" g="0" b="0"/>
-      </a:lnRef>
-      <a:fillRef idx="0">
-        <a:scrgbClr r="0" g="0" b="0"/>
-      </a:fillRef>
-      <a:effectRef idx="0">
-        <a:scrgbClr r="0" g="0" b="0"/>
-      </a:effectRef>
-      <a:fontRef idx="minor"/>
-    </dgm:style>
-  </dgm:styleLbl>
-  <dgm:styleLbl name="fgAcc1">
-    <dgm:scene3d>
-      <a:camera prst="orthographicFront"/>
-      <a:lightRig rig="threePt" dir="t"/>
-    </dgm:scene3d>
-    <dgm:sp3d/>
-    <dgm:txPr/>
-    <dgm:style>
-      <a:lnRef idx="2">
-        <a:scrgbClr r="0" g="0" b="0"/>
-      </a:lnRef>
-      <a:fillRef idx="1">
-        <a:scrgbClr r="0" g="0" b="0"/>
-      </a:fillRef>
-      <a:effectRef idx="0">
-        <a:scrgbClr r="0" g="0" b="0"/>
-      </a:effectRef>
-      <a:fontRef idx="minor"/>
-    </dgm:style>
-  </dgm:styleLbl>
-  <dgm:styleLbl name="conFgAcc1">
-    <dgm:scene3d>
-      <a:camera prst="orthographicFront"/>
-      <a:lightRig rig="threePt" dir="t"/>
-    </dgm:scene3d>
-    <dgm:sp3d/>
-    <dgm:txPr/>
-    <dgm:style>
-      <a:lnRef idx="2">
-        <a:scrgbClr r="0" g="0" b="0"/>
-      </a:lnRef>
-      <a:fillRef idx="1">
-        <a:scrgbClr r="0" g="0" b="0"/>
-      </a:fillRef>
-      <a:effectRef idx="0">
-        <a:scrgbClr r="0" g="0" b="0"/>
-      </a:effectRef>
-      <a:fontRef idx="minor"/>
-    </dgm:style>
-  </dgm:styleLbl>
-  <dgm:styleLbl name="alignAcc1">
-    <dgm:scene3d>
-      <a:camera prst="orthographicFront"/>
-      <a:lightRig rig="threePt" dir="t"/>
-    </dgm:scene3d>
-    <dgm:sp3d/>
-    <dgm:txPr/>
-    <dgm:style>
-      <a:lnRef idx="2">
-        <a:scrgbClr r="0" g="0" b="0"/>
-      </a:lnRef>
-      <a:fillRef idx="1">
-        <a:scrgbClr r="0" g="0" b="0"/>
-      </a:fillRef>
-      <a:effectRef idx="0">
-        <a:scrgbClr r="0" g="0" b="0"/>
-      </a:effectRef>
-      <a:fontRef idx="minor"/>
-    </dgm:style>
-  </dgm:styleLbl>
-  <dgm:styleLbl name="trAlignAcc1">
-    <dgm:scene3d>
-      <a:camera prst="orthographicFront"/>
-      <a:lightRig rig="threePt" dir="t"/>
-    </dgm:scene3d>
-    <dgm:sp3d/>
-    <dgm:txPr/>
-    <dgm:style>
-      <a:lnRef idx="1">
-        <a:scrgbClr r="0" g="0" b="0"/>
-      </a:lnRef>
-      <a:fillRef idx="1">
-        <a:scrgbClr r="0" g="0" b="0"/>
-      </a:fillRef>
-      <a:effectRef idx="0">
-        <a:scrgbClr r="0" g="0" b="0"/>
-      </a:effectRef>
-      <a:fontRef idx="minor"/>
-    </dgm:style>
-  </dgm:styleLbl>
-  <dgm:styleLbl name="bgAcc1">
-    <dgm:scene3d>
-      <a:camera prst="orthographicFront"/>
-      <a:lightRig rig="threePt" dir="t"/>
-    </dgm:scene3d>
-    <dgm:sp3d/>
-    <dgm:txPr/>
-    <dgm:style>
-      <a:lnRef idx="2">
-        <a:scrgbClr r="0" g="0" b="0"/>
-      </a:lnRef>
-      <a:fillRef idx="1">
-        <a:scrgbClr r="0" g="0" b="0"/>
-      </a:fillRef>
-      <a:effectRef idx="0">
-        <a:scrgbClr r="0" g="0" b="0"/>
-      </a:effectRef>
-      <a:fontRef idx="minor"/>
-    </dgm:style>
-  </dgm:styleLbl>
-  <dgm:styleLbl name="solidFgAcc1">
-    <dgm:scene3d>
-      <a:camera prst="orthographicFront"/>
-      <a:lightRig rig="threePt" dir="t"/>
-    </dgm:scene3d>
-    <dgm:sp3d/>
-    <dgm:txPr/>
-    <dgm:style>
-      <a:lnRef idx="2">
-        <a:scrgbClr r="0" g="0" b="0"/>
-      </a:lnRef>
-      <a:fillRef idx="1">
-        <a:scrgbClr r="0" g="0" b="0"/>
-      </a:fillRef>
-      <a:effectRef idx="0">
-        <a:scrgbClr r="0" g="0" b="0"/>
-      </a:effectRef>
-      <a:fontRef idx="minor"/>
-    </dgm:style>
-  </dgm:styleLbl>
-  <dgm:styleLbl name="solidAlignAcc1">
-    <dgm:scene3d>
-      <a:camera prst="orthographicFront"/>
-      <a:lightRig rig="threePt" dir="t"/>
-    </dgm:scene3d>
-    <dgm:sp3d/>
-    <dgm:txPr/>
-    <dgm:style>
-      <a:lnRef idx="2">
-        <a:scrgbClr r="0" g="0" b="0"/>
-      </a:lnRef>
-      <a:fillRef idx="1">
-        <a:scrgbClr r="0" g="0" b="0"/>
-      </a:fillRef>
-      <a:effectRef idx="0">
-        <a:scrgbClr r="0" g="0" b="0"/>
-      </a:effectRef>
-      <a:fontRef idx="minor"/>
-    </dgm:style>
-  </dgm:styleLbl>
-  <dgm:styleLbl name="solidBgAcc1">
-    <dgm:scene3d>
-      <a:camera prst="orthographicFront"/>
-      <a:lightRig rig="threePt" dir="t"/>
-    </dgm:scene3d>
-    <dgm:sp3d/>
-    <dgm:txPr/>
-    <dgm:style>
-      <a:lnRef idx="2">
-        <a:scrgbClr r="0" g="0" b="0"/>
-      </a:lnRef>
-      <a:fillRef idx="1">
-        <a:scrgbClr r="0" g="0" b="0"/>
-      </a:fillRef>
-      <a:effectRef idx="0">
-        <a:scrgbClr r="0" g="0" b="0"/>
-      </a:effectRef>
-      <a:fontRef idx="minor"/>
-    </dgm:style>
-  </dgm:styleLbl>
-  <dgm:styleLbl name="fgAccFollowNode1">
-    <dgm:scene3d>
-      <a:camera prst="orthographicFront"/>
-      <a:lightRig rig="threePt" dir="t"/>
-    </dgm:scene3d>
-    <dgm:sp3d/>
-    <dgm:txPr/>
-    <dgm:style>
-      <a:lnRef idx="2">
-        <a:scrgbClr r="0" g="0" b="0"/>
-      </a:lnRef>
-      <a:fillRef idx="1">
-        <a:scrgbClr r="0" g="0" b="0"/>
-      </a:fillRef>
-      <a:effectRef idx="0">
-        <a:scrgbClr r="0" g="0" b="0"/>
-      </a:effectRef>
-      <a:fontRef idx="minor"/>
-    </dgm:style>
-  </dgm:styleLbl>
-  <dgm:styleLbl name="alignAccFollowNode1">
-    <dgm:scene3d>
-      <a:camera prst="orthographicFront"/>
-      <a:lightRig rig="threePt" dir="t"/>
-    </dgm:scene3d>
-    <dgm:sp3d/>
-    <dgm:txPr/>
-    <dgm:style>
-      <a:lnRef idx="2">
-        <a:scrgbClr r="0" g="0" b="0"/>
-      </a:lnRef>
-      <a:fillRef idx="1">
-        <a:scrgbClr r="0" g="0" b="0"/>
-      </a:fillRef>
-      <a:effectRef idx="0">
-        <a:scrgbClr r="0" g="0" b="0"/>
-      </a:effectRef>
-      <a:fontRef idx="minor"/>
-    </dgm:style>
-  </dgm:styleLbl>
-  <dgm:styleLbl name="bgAccFollowNode1">
-    <dgm:scene3d>
-      <a:camera prst="orthographicFront"/>
-      <a:lightRig rig="threePt" dir="t"/>
-    </dgm:scene3d>
-    <dgm:sp3d/>
-    <dgm:txPr/>
-    <dgm:style>
-      <a:lnRef idx="2">
-        <a:scrgbClr r="0" g="0" b="0"/>
-      </a:lnRef>
-      <a:fillRef idx="1">
-        <a:scrgbClr r="0" g="0" b="0"/>
-      </a:fillRef>
-      <a:effectRef idx="0">
-        <a:scrgbClr r="0" g="0" b="0"/>
-      </a:effectRef>
-      <a:fontRef idx="minor"/>
-    </dgm:style>
-  </dgm:styleLbl>
-  <dgm:styleLbl name="fgAcc0">
-    <dgm:scene3d>
-      <a:camera prst="orthographicFront"/>
-      <a:lightRig rig="threePt" dir="t"/>
-    </dgm:scene3d>
-    <dgm:sp3d/>
-    <dgm:txPr/>
-    <dgm:style>
-      <a:lnRef idx="2">
-        <a:scrgbClr r="0" g="0" b="0"/>
-      </a:lnRef>
-      <a:fillRef idx="1">
-        <a:scrgbClr r="0" g="0" b="0"/>
-      </a:fillRef>
-      <a:effectRef idx="0">
-        <a:scrgbClr r="0" g="0" b="0"/>
-      </a:effectRef>
-      <a:fontRef idx="minor"/>
-    </dgm:style>
-  </dgm:styleLbl>
-  <dgm:styleLbl name="fgAcc2">
-    <dgm:scene3d>
-      <a:camera prst="orthographicFront"/>
-      <a:lightRig rig="threePt" dir="t"/>
-    </dgm:scene3d>
-    <dgm:sp3d/>
-    <dgm:txPr/>
-    <dgm:style>
-      <a:lnRef idx="2">
-        <a:scrgbClr r="0" g="0" b="0"/>
-      </a:lnRef>
-      <a:fillRef idx="1">
-        <a:scrgbClr r="0" g="0" b="0"/>
-      </a:fillRef>
-      <a:effectRef idx="0">
-        <a:scrgbClr r="0" g="0" b="0"/>
-      </a:effectRef>
-      <a:fontRef idx="minor"/>
-    </dgm:style>
-  </dgm:styleLbl>
-  <dgm:styleLbl name="fgAcc3">
-    <dgm:scene3d>
-      <a:camera prst="orthographicFront"/>
-      <a:lightRig rig="threePt" dir="t"/>
-    </dgm:scene3d>
-    <dgm:sp3d/>
-    <dgm:txPr/>
-    <dgm:style>
-      <a:lnRef idx="2">
-        <a:scrgbClr r="0" g="0" b="0"/>
-      </a:lnRef>
-      <a:fillRef idx="1">
-        <a:scrgbClr r="0" g="0" b="0"/>
-      </a:fillRef>
-      <a:effectRef idx="0">
-        <a:scrgbClr r="0" g="0" b="0"/>
-      </a:effectRef>
-      <a:fontRef idx="minor"/>
-    </dgm:style>
-  </dgm:styleLbl>
-  <dgm:styleLbl name="fgAcc4">
-    <dgm:scene3d>
-      <a:camera prst="orthographicFront"/>
-      <a:lightRig rig="threePt" dir="t"/>
-    </dgm:scene3d>
-    <dgm:sp3d/>
-    <dgm:txPr/>
-    <dgm:style>
-      <a:lnRef idx="2">
-        <a:scrgbClr r="0" g="0" b="0"/>
-      </a:lnRef>
-      <a:fillRef idx="1">
-        <a:scrgbClr r="0" g="0" b="0"/>
-      </a:fillRef>
-      <a:effectRef idx="0">
-        <a:scrgbClr r="0" g="0" b="0"/>
-      </a:effectRef>
-      <a:fontRef idx="minor"/>
-    </dgm:style>
-  </dgm:styleLbl>
-  <dgm:styleLbl name="bgShp">
-    <dgm:scene3d>
-      <a:camera prst="orthographicFront"/>
-      <a:lightRig rig="threePt" dir="t"/>
-    </dgm:scene3d>
-    <dgm:sp3d/>
-    <dgm:txPr/>
-    <dgm:style>
-      <a:lnRef idx="0">
-        <a:scrgbClr r="0" g="0" b="0"/>
-      </a:lnRef>
-      <a:fillRef idx="1">
-        <a:scrgbClr r="0" g="0" b="0"/>
-      </a:fillRef>
-      <a:effectRef idx="0">
-        <a:scrgbClr r="0" g="0" b="0"/>
-      </a:effectRef>
-      <a:fontRef idx="minor"/>
-    </dgm:style>
-  </dgm:styleLbl>
-  <dgm:styleLbl name="dkBgShp">
-    <dgm:scene3d>
-      <a:camera prst="orthographicFront"/>
-      <a:lightRig rig="threePt" dir="t"/>
-    </dgm:scene3d>
-    <dgm:sp3d/>
-    <dgm:txPr/>
-    <dgm:style>
-      <a:lnRef idx="0">
-        <a:scrgbClr r="0" g="0" b="0"/>
-      </a:lnRef>
-      <a:fillRef idx="1">
-        <a:scrgbClr r="0" g="0" b="0"/>
-      </a:fillRef>
-      <a:effectRef idx="0">
-        <a:scrgbClr r="0" g="0" b="0"/>
-      </a:effectRef>
-      <a:fontRef idx="minor"/>
-    </dgm:style>
-  </dgm:styleLbl>
-  <dgm:styleLbl name="trBgShp">
-    <dgm:scene3d>
-      <a:camera prst="orthographicFront"/>
-      <a:lightRig rig="threePt" dir="t"/>
-    </dgm:scene3d>
-    <dgm:sp3d/>
-    <dgm:txPr/>
-    <dgm:style>
-      <a:lnRef idx="0">
-        <a:scrgbClr r="0" g="0" b="0"/>
-      </a:lnRef>
-      <a:fillRef idx="1">
-        <a:scrgbClr r="0" g="0" b="0"/>
-      </a:fillRef>
-      <a:effectRef idx="0">
-        <a:scrgbClr r="0" g="0" b="0"/>
-      </a:effectRef>
-      <a:fontRef idx="minor"/>
-    </dgm:style>
-  </dgm:styleLbl>
-  <dgm:styleLbl name="fgShp">
-    <dgm:scene3d>
-      <a:camera prst="orthographicFront"/>
-      <a:lightRig rig="threePt" dir="t"/>
-    </dgm:scene3d>
-    <dgm:sp3d/>
-    <dgm:txPr/>
-    <dgm:style>
-      <a:lnRef idx="2">
-        <a:scrgbClr r="0" g="0" b="0"/>
-      </a:lnRef>
-      <a:fillRef idx="1">
-        <a:scrgbClr r="0" g="0" b="0"/>
-      </a:fillRef>
-      <a:effectRef idx="0">
-        <a:scrgbClr r="0" g="0" b="0"/>
-      </a:effectRef>
-      <a:fontRef idx="minor"/>
-    </dgm:style>
-  </dgm:styleLbl>
-  <dgm:styleLbl name="revTx">
-    <dgm:scene3d>
-      <a:camera prst="orthographicFront"/>
-      <a:lightRig rig="threePt" dir="t"/>
-    </dgm:scene3d>
-    <dgm:sp3d/>
-    <dgm:txPr/>
-    <dgm:style>
-      <a:lnRef idx="0">
-        <a:scrgbClr r="0" g="0" b="0"/>
-      </a:lnRef>
-      <a:fillRef idx="0">
-        <a:scrgbClr r="0" g="0" b="0"/>
-      </a:fillRef>
-      <a:effectRef idx="0">
-        <a:scrgbClr r="0" g="0" b="0"/>
-      </a:effectRef>
-      <a:fontRef idx="minor"/>
-    </dgm:style>
-  </dgm:styleLbl>
-</dgm:styleDef>
-</file>
-
-<file path=ppt/diagrams/quickStyle3.xml><?xml version="1.0" encoding="utf-8"?>
 <dgm:styleDef xmlns:dgm="http://schemas.openxmlformats.org/drawingml/2006/diagram" xmlns:a="http://schemas.openxmlformats.org/drawingml/2006/main" uniqueId="urn:microsoft.com/office/officeart/2005/8/quickstyle/simple1">
   <dgm:title val=""/>
   <dgm:desc val=""/>
@@ -9914,7 +6888,7 @@
           <a:p>
             <a:fld id="{C3E4802E-3A1F-476D-8C5F-FA8A5493684E}" type="datetimeFigureOut">
               <a:rPr lang="en-US" smtClean="0"/>
-              <a:t>2/24/2024</a:t>
+              <a:t>2/25/2024</a:t>
             </a:fld>
             <a:endParaRPr lang="en-US"/>
           </a:p>
@@ -10347,7 +7321,7 @@
           <a:p>
             <a:fld id="{D9DD7745-79BD-4570-92F6-045CD7F1EEDB}" type="slidenum">
               <a:rPr lang="en-US" smtClean="0"/>
-              <a:t>7</a:t>
+              <a:t>6</a:t>
             </a:fld>
             <a:endParaRPr lang="en-US"/>
           </a:p>
@@ -10531,7 +7505,7 @@
           <a:p>
             <a:fld id="{D9DD7745-79BD-4570-92F6-045CD7F1EEDB}" type="slidenum">
               <a:rPr lang="en-US" smtClean="0"/>
-              <a:t>12</a:t>
+              <a:t>11</a:t>
             </a:fld>
             <a:endParaRPr lang="en-US"/>
           </a:p>
@@ -10699,7 +7673,7 @@
           <a:p>
             <a:fld id="{18DEE92F-2343-460E-A87F-DC2FD6DE70C4}" type="datetimeFigureOut">
               <a:rPr lang="en-US" smtClean="0"/>
-              <a:t>2/24/2024</a:t>
+              <a:t>2/25/2024</a:t>
             </a:fld>
             <a:endParaRPr lang="en-US"/>
           </a:p>
@@ -10899,7 +7873,7 @@
           <a:p>
             <a:fld id="{18DEE92F-2343-460E-A87F-DC2FD6DE70C4}" type="datetimeFigureOut">
               <a:rPr lang="en-US" smtClean="0"/>
-              <a:t>2/24/2024</a:t>
+              <a:t>2/25/2024</a:t>
             </a:fld>
             <a:endParaRPr lang="en-US"/>
           </a:p>
@@ -11109,7 +8083,7 @@
           <a:p>
             <a:fld id="{18DEE92F-2343-460E-A87F-DC2FD6DE70C4}" type="datetimeFigureOut">
               <a:rPr lang="en-US" smtClean="0"/>
-              <a:t>2/24/2024</a:t>
+              <a:t>2/25/2024</a:t>
             </a:fld>
             <a:endParaRPr lang="en-US"/>
           </a:p>
@@ -11309,7 +8283,7 @@
           <a:p>
             <a:fld id="{18DEE92F-2343-460E-A87F-DC2FD6DE70C4}" type="datetimeFigureOut">
               <a:rPr lang="en-US" smtClean="0"/>
-              <a:t>2/24/2024</a:t>
+              <a:t>2/25/2024</a:t>
             </a:fld>
             <a:endParaRPr lang="en-US"/>
           </a:p>
@@ -11585,7 +8559,7 @@
           <a:p>
             <a:fld id="{18DEE92F-2343-460E-A87F-DC2FD6DE70C4}" type="datetimeFigureOut">
               <a:rPr lang="en-US" smtClean="0"/>
-              <a:t>2/24/2024</a:t>
+              <a:t>2/25/2024</a:t>
             </a:fld>
             <a:endParaRPr lang="en-US"/>
           </a:p>
@@ -11853,7 +8827,7 @@
           <a:p>
             <a:fld id="{18DEE92F-2343-460E-A87F-DC2FD6DE70C4}" type="datetimeFigureOut">
               <a:rPr lang="en-US" smtClean="0"/>
-              <a:t>2/24/2024</a:t>
+              <a:t>2/25/2024</a:t>
             </a:fld>
             <a:endParaRPr lang="en-US"/>
           </a:p>
@@ -12268,7 +9242,7 @@
           <a:p>
             <a:fld id="{18DEE92F-2343-460E-A87F-DC2FD6DE70C4}" type="datetimeFigureOut">
               <a:rPr lang="en-US" smtClean="0"/>
-              <a:t>2/24/2024</a:t>
+              <a:t>2/25/2024</a:t>
             </a:fld>
             <a:endParaRPr lang="en-US"/>
           </a:p>
@@ -12410,7 +9384,7 @@
           <a:p>
             <a:fld id="{18DEE92F-2343-460E-A87F-DC2FD6DE70C4}" type="datetimeFigureOut">
               <a:rPr lang="en-US" smtClean="0"/>
-              <a:t>2/24/2024</a:t>
+              <a:t>2/25/2024</a:t>
             </a:fld>
             <a:endParaRPr lang="en-US"/>
           </a:p>
@@ -12523,7 +9497,7 @@
           <a:p>
             <a:fld id="{18DEE92F-2343-460E-A87F-DC2FD6DE70C4}" type="datetimeFigureOut">
               <a:rPr lang="en-US" smtClean="0"/>
-              <a:t>2/24/2024</a:t>
+              <a:t>2/25/2024</a:t>
             </a:fld>
             <a:endParaRPr lang="en-US"/>
           </a:p>
@@ -12836,7 +9810,7 @@
           <a:p>
             <a:fld id="{18DEE92F-2343-460E-A87F-DC2FD6DE70C4}" type="datetimeFigureOut">
               <a:rPr lang="en-US" smtClean="0"/>
-              <a:t>2/24/2024</a:t>
+              <a:t>2/25/2024</a:t>
             </a:fld>
             <a:endParaRPr lang="en-US"/>
           </a:p>
@@ -13125,7 +10099,7 @@
           <a:p>
             <a:fld id="{18DEE92F-2343-460E-A87F-DC2FD6DE70C4}" type="datetimeFigureOut">
               <a:rPr lang="en-US" smtClean="0"/>
-              <a:t>2/24/2024</a:t>
+              <a:t>2/25/2024</a:t>
             </a:fld>
             <a:endParaRPr lang="en-US"/>
           </a:p>
@@ -13368,7 +10342,7 @@
           <a:p>
             <a:fld id="{18DEE92F-2343-460E-A87F-DC2FD6DE70C4}" type="datetimeFigureOut">
               <a:rPr lang="en-US" smtClean="0"/>
-              <a:t>2/24/2024</a:t>
+              <a:t>2/25/2024</a:t>
             </a:fld>
             <a:endParaRPr lang="en-US"/>
           </a:p>
@@ -13896,136 +10870,6 @@
           <a:chExt cx="0" cy="0"/>
         </a:xfrm>
       </p:grpSpPr>
-      <p:sp>
-        <p:nvSpPr>
-          <p:cNvPr id="2" name="Titel 1">
-            <a:extLst>
-              <a:ext uri="{FF2B5EF4-FFF2-40B4-BE49-F238E27FC236}">
-                <a16:creationId xmlns:a16="http://schemas.microsoft.com/office/drawing/2014/main" id="{3D12C5CA-E520-8343-6B63-F98E42E089BC}"/>
-              </a:ext>
-            </a:extLst>
-          </p:cNvPr>
-          <p:cNvSpPr>
-            <a:spLocks noGrp="1"/>
-          </p:cNvSpPr>
-          <p:nvPr>
-            <p:ph type="title"/>
-          </p:nvPr>
-        </p:nvSpPr>
-        <p:spPr/>
-        <p:txBody>
-          <a:bodyPr/>
-          <a:lstStyle/>
-          <a:p>
-            <a:r>
-              <a:rPr lang="de-DE" dirty="0"/>
-              <a:t>Strukturierte Daten – Zugriffverfahren</a:t>
-            </a:r>
-            <a:endParaRPr lang="en-US" dirty="0"/>
-          </a:p>
-        </p:txBody>
-      </p:sp>
-      <p:sp>
-        <p:nvSpPr>
-          <p:cNvPr id="3" name="Inhaltsplatzhalter 2">
-            <a:extLst>
-              <a:ext uri="{FF2B5EF4-FFF2-40B4-BE49-F238E27FC236}">
-                <a16:creationId xmlns:a16="http://schemas.microsoft.com/office/drawing/2014/main" id="{B42A4488-4288-36D2-8D40-F4E607B2120E}"/>
-              </a:ext>
-            </a:extLst>
-          </p:cNvPr>
-          <p:cNvSpPr>
-            <a:spLocks noGrp="1"/>
-          </p:cNvSpPr>
-          <p:nvPr>
-            <p:ph idx="1"/>
-          </p:nvPr>
-        </p:nvSpPr>
-        <p:spPr/>
-        <p:txBody>
-          <a:bodyPr/>
-          <a:lstStyle/>
-          <a:p>
-            <a:r>
-              <a:rPr lang="de-DE" dirty="0"/>
-              <a:t>Da die Log Daten strukturiert sind, werden diese in einer relationalen Datenbank gespeichert</a:t>
-            </a:r>
-          </a:p>
-          <a:p>
-            <a:r>
-              <a:rPr lang="de-DE" dirty="0"/>
-              <a:t>Aufgrund der angegebenen Kundenwünsche wurde ein SQL Server für die Datenbank genutzt</a:t>
-            </a:r>
-          </a:p>
-          <a:p>
-            <a:r>
-              <a:rPr lang="de-DE" dirty="0"/>
-              <a:t>Zugriff erfolgt über einen Datenbankzugriff</a:t>
-            </a:r>
-            <a:endParaRPr lang="en-US" dirty="0"/>
-          </a:p>
-        </p:txBody>
-      </p:sp>
-      <p:pic>
-        <p:nvPicPr>
-          <p:cNvPr id="5" name="Grafik 4">
-            <a:extLst>
-              <a:ext uri="{FF2B5EF4-FFF2-40B4-BE49-F238E27FC236}">
-                <a16:creationId xmlns:a16="http://schemas.microsoft.com/office/drawing/2014/main" id="{44C2FE6A-9AE6-A20D-4FFC-F598C74F9E3B}"/>
-              </a:ext>
-            </a:extLst>
-          </p:cNvPr>
-          <p:cNvPicPr>
-            <a:picLocks noChangeAspect="1"/>
-          </p:cNvPicPr>
-          <p:nvPr/>
-        </p:nvPicPr>
-        <p:blipFill>
-          <a:blip r:embed="rId2"/>
-          <a:stretch>
-            <a:fillRect/>
-          </a:stretch>
-        </p:blipFill>
-        <p:spPr>
-          <a:xfrm>
-            <a:off x="1262101" y="4184373"/>
-            <a:ext cx="2436018" cy="2466756"/>
-          </a:xfrm>
-          <a:prstGeom prst="rect">
-            <a:avLst/>
-          </a:prstGeom>
-        </p:spPr>
-      </p:pic>
-    </p:spTree>
-    <p:extLst>
-      <p:ext uri="{BB962C8B-B14F-4D97-AF65-F5344CB8AC3E}">
-        <p14:creationId xmlns:p14="http://schemas.microsoft.com/office/powerpoint/2010/main" val="2018274000"/>
-      </p:ext>
-    </p:extLst>
-  </p:cSld>
-  <p:clrMapOvr>
-    <a:masterClrMapping/>
-  </p:clrMapOvr>
-</p:sld>
-</file>
-
-<file path=ppt/slides/slide11.xml><?xml version="1.0" encoding="utf-8"?>
-<p:sld xmlns:a="http://schemas.openxmlformats.org/drawingml/2006/main" xmlns:r="http://schemas.openxmlformats.org/officeDocument/2006/relationships" xmlns:p="http://schemas.openxmlformats.org/presentationml/2006/main">
-  <p:cSld>
-    <p:spTree>
-      <p:nvGrpSpPr>
-        <p:cNvPr id="1" name=""/>
-        <p:cNvGrpSpPr/>
-        <p:nvPr/>
-      </p:nvGrpSpPr>
-      <p:grpSpPr>
-        <a:xfrm>
-          <a:off x="0" y="0"/>
-          <a:ext cx="0" cy="0"/>
-          <a:chOff x="0" y="0"/>
-          <a:chExt cx="0" cy="0"/>
-        </a:xfrm>
-      </p:grpSpPr>
       <p:graphicFrame>
         <p:nvGraphicFramePr>
           <p:cNvPr id="7" name="Inhaltsplatzhalter 2">
@@ -14103,7 +10947,7 @@
 </p:sld>
 </file>
 
-<file path=ppt/slides/slide12.xml><?xml version="1.0" encoding="utf-8"?>
+<file path=ppt/slides/slide11.xml><?xml version="1.0" encoding="utf-8"?>
 <p:sld xmlns:a="http://schemas.openxmlformats.org/drawingml/2006/main" xmlns:r="http://schemas.openxmlformats.org/officeDocument/2006/relationships" xmlns:p="http://schemas.openxmlformats.org/presentationml/2006/main">
   <p:cSld>
     <p:spTree>
@@ -14344,7 +11188,7 @@
 </p:sld>
 </file>
 
-<file path=ppt/slides/slide13.xml><?xml version="1.0" encoding="utf-8"?>
+<file path=ppt/slides/slide12.xml><?xml version="1.0" encoding="utf-8"?>
 <p:sld xmlns:a="http://schemas.openxmlformats.org/drawingml/2006/main" xmlns:r="http://schemas.openxmlformats.org/officeDocument/2006/relationships" xmlns:p="http://schemas.openxmlformats.org/presentationml/2006/main">
   <p:cSld>
     <p:spTree>
@@ -14483,7 +11327,7 @@
 </p:sld>
 </file>
 
-<file path=ppt/slides/slide14.xml><?xml version="1.0" encoding="utf-8"?>
+<file path=ppt/slides/slide13.xml><?xml version="1.0" encoding="utf-8"?>
 <p:sld xmlns:a="http://schemas.openxmlformats.org/drawingml/2006/main" xmlns:r="http://schemas.openxmlformats.org/officeDocument/2006/relationships" xmlns:p="http://schemas.openxmlformats.org/presentationml/2006/main">
   <p:cSld>
     <p:spTree>
@@ -14642,7 +11486,7 @@
 </p:sld>
 </file>
 
-<file path=ppt/slides/slide15.xml><?xml version="1.0" encoding="utf-8"?>
+<file path=ppt/slides/slide14.xml><?xml version="1.0" encoding="utf-8"?>
 <p:sld xmlns:a="http://schemas.openxmlformats.org/drawingml/2006/main" xmlns:r="http://schemas.openxmlformats.org/officeDocument/2006/relationships" xmlns:p="http://schemas.openxmlformats.org/presentationml/2006/main">
   <p:cSld>
     <p:spTree>
@@ -14759,7 +11603,7 @@
 </p:sld>
 </file>
 
-<file path=ppt/slides/slide16.xml><?xml version="1.0" encoding="utf-8"?>
+<file path=ppt/slides/slide15.xml><?xml version="1.0" encoding="utf-8"?>
 <p:sld xmlns:a="http://schemas.openxmlformats.org/drawingml/2006/main" xmlns:r="http://schemas.openxmlformats.org/officeDocument/2006/relationships" xmlns:p="http://schemas.openxmlformats.org/presentationml/2006/main">
   <p:cSld>
     <p:spTree>
@@ -14919,7 +11763,7 @@
 </p:sld>
 </file>
 
-<file path=ppt/slides/slide17.xml><?xml version="1.0" encoding="utf-8"?>
+<file path=ppt/slides/slide16.xml><?xml version="1.0" encoding="utf-8"?>
 <p:sld xmlns:a="http://schemas.openxmlformats.org/drawingml/2006/main" xmlns:r="http://schemas.openxmlformats.org/officeDocument/2006/relationships" xmlns:p="http://schemas.openxmlformats.org/presentationml/2006/main">
   <p:cSld>
     <p:spTree>
@@ -15214,7 +12058,7 @@
 </p:sld>
 </file>
 
-<file path=ppt/slides/slide18.xml><?xml version="1.0" encoding="utf-8"?>
+<file path=ppt/slides/slide17.xml><?xml version="1.0" encoding="utf-8"?>
 <p:sld xmlns:a="http://schemas.openxmlformats.org/drawingml/2006/main" xmlns:r="http://schemas.openxmlformats.org/officeDocument/2006/relationships" xmlns:p="http://schemas.openxmlformats.org/presentationml/2006/main">
   <p:cSld>
     <p:spTree>
@@ -15345,7 +12189,7 @@
 </p:sld>
 </file>
 
-<file path=ppt/slides/slide19.xml><?xml version="1.0" encoding="utf-8"?>
+<file path=ppt/slides/slide18.xml><?xml version="1.0" encoding="utf-8"?>
 <p:sld xmlns:a="http://schemas.openxmlformats.org/drawingml/2006/main" xmlns:r="http://schemas.openxmlformats.org/officeDocument/2006/relationships" xmlns:p="http://schemas.openxmlformats.org/presentationml/2006/main">
   <p:cSld>
     <p:spTree>
@@ -15608,172 +12452,7 @@
 </p:sld>
 </file>
 
-<file path=ppt/slides/slide2.xml><?xml version="1.0" encoding="utf-8"?>
-<p:sld xmlns:a="http://schemas.openxmlformats.org/drawingml/2006/main" xmlns:r="http://schemas.openxmlformats.org/officeDocument/2006/relationships" xmlns:p="http://schemas.openxmlformats.org/presentationml/2006/main">
-  <p:cSld>
-    <p:spTree>
-      <p:nvGrpSpPr>
-        <p:cNvPr id="1" name=""/>
-        <p:cNvGrpSpPr/>
-        <p:nvPr/>
-      </p:nvGrpSpPr>
-      <p:grpSpPr>
-        <a:xfrm>
-          <a:off x="0" y="0"/>
-          <a:ext cx="0" cy="0"/>
-          <a:chOff x="0" y="0"/>
-          <a:chExt cx="0" cy="0"/>
-        </a:xfrm>
-      </p:grpSpPr>
-      <p:sp>
-        <p:nvSpPr>
-          <p:cNvPr id="2" name="Titel 1">
-            <a:extLst>
-              <a:ext uri="{FF2B5EF4-FFF2-40B4-BE49-F238E27FC236}">
-                <a16:creationId xmlns:a16="http://schemas.microsoft.com/office/drawing/2014/main" id="{EF0A671E-3F0C-E208-A30F-3531121F5CAB}"/>
-              </a:ext>
-            </a:extLst>
-          </p:cNvPr>
-          <p:cNvSpPr>
-            <a:spLocks noGrp="1"/>
-          </p:cNvSpPr>
-          <p:nvPr>
-            <p:ph type="title"/>
-          </p:nvPr>
-        </p:nvSpPr>
-        <p:spPr/>
-        <p:txBody>
-          <a:bodyPr/>
-          <a:lstStyle/>
-          <a:p>
-            <a:r>
-              <a:rPr lang="de-DE" dirty="0"/>
-              <a:t>Business Understanding – Problem</a:t>
-            </a:r>
-            <a:endParaRPr lang="en-US" dirty="0"/>
-          </a:p>
-        </p:txBody>
-      </p:sp>
-      <p:sp>
-        <p:nvSpPr>
-          <p:cNvPr id="3" name="Inhaltsplatzhalter 2">
-            <a:extLst>
-              <a:ext uri="{FF2B5EF4-FFF2-40B4-BE49-F238E27FC236}">
-                <a16:creationId xmlns:a16="http://schemas.microsoft.com/office/drawing/2014/main" id="{FB693121-058C-0414-6A28-F2AF176FF0F7}"/>
-              </a:ext>
-            </a:extLst>
-          </p:cNvPr>
-          <p:cNvSpPr>
-            <a:spLocks noGrp="1"/>
-          </p:cNvSpPr>
-          <p:nvPr>
-            <p:ph idx="1"/>
-          </p:nvPr>
-        </p:nvSpPr>
-        <p:spPr/>
-        <p:txBody>
-          <a:bodyPr>
-            <a:normAutofit/>
-          </a:bodyPr>
-          <a:lstStyle/>
-          <a:p>
-            <a:pPr>
-              <a:buFont typeface="Wingdings" panose="05000000000000000000" pitchFamily="2" charset="2"/>
-              <a:buChar char="à"/>
-            </a:pPr>
-            <a:r>
-              <a:rPr lang="de-DE" dirty="0">
-                <a:sym typeface="Wingdings" panose="05000000000000000000" pitchFamily="2" charset="2"/>
-              </a:rPr>
-              <a:t>Auftraggeber ist ein Unternehmen, welches Raketen herstellt</a:t>
-            </a:r>
-          </a:p>
-          <a:p>
-            <a:pPr marL="0" indent="0">
-              <a:buNone/>
-            </a:pPr>
-            <a:endParaRPr lang="de-DE" dirty="0">
-              <a:sym typeface="Wingdings" panose="05000000000000000000" pitchFamily="2" charset="2"/>
-            </a:endParaRPr>
-          </a:p>
-          <a:p>
-            <a:pPr marL="0" indent="0">
-              <a:buNone/>
-            </a:pPr>
-            <a:r>
-              <a:rPr lang="de-DE" dirty="0">
-                <a:sym typeface="Wingdings" panose="05000000000000000000" pitchFamily="2" charset="2"/>
-              </a:rPr>
-              <a:t>Problem:</a:t>
-            </a:r>
-          </a:p>
-          <a:p>
-            <a:pPr marL="0" indent="0">
-              <a:buNone/>
-            </a:pPr>
-            <a:r>
-              <a:rPr lang="de-DE" dirty="0">
-                <a:sym typeface="Wingdings" panose="05000000000000000000" pitchFamily="2" charset="2"/>
-              </a:rPr>
-              <a:t>Häufige unvorhergesehene Produktionsausfälle</a:t>
-            </a:r>
-          </a:p>
-          <a:p>
-            <a:pPr marL="0" indent="0">
-              <a:buNone/>
-            </a:pPr>
-            <a:r>
-              <a:rPr lang="de-DE" dirty="0">
-                <a:sym typeface="Wingdings" panose="05000000000000000000" pitchFamily="2" charset="2"/>
-              </a:rPr>
-              <a:t>- Produktion verzögert sich</a:t>
-            </a:r>
-          </a:p>
-          <a:p>
-            <a:pPr marL="0" indent="0">
-              <a:buNone/>
-            </a:pPr>
-            <a:r>
-              <a:rPr lang="de-DE" dirty="0">
-                <a:sym typeface="Wingdings" panose="05000000000000000000" pitchFamily="2" charset="2"/>
-              </a:rPr>
-              <a:t>- Hohe Kosten entstehen</a:t>
-            </a:r>
-          </a:p>
-          <a:p>
-            <a:pPr marL="0" indent="0">
-              <a:buNone/>
-            </a:pPr>
-            <a:r>
-              <a:rPr lang="de-DE" dirty="0">
-                <a:sym typeface="Wingdings" panose="05000000000000000000" pitchFamily="2" charset="2"/>
-              </a:rPr>
-              <a:t>Kundenzufriedenheit ist durch die Produktionsausfälle gesunken</a:t>
-            </a:r>
-          </a:p>
-          <a:p>
-            <a:pPr>
-              <a:buFont typeface="Wingdings" panose="05000000000000000000" pitchFamily="2" charset="2"/>
-              <a:buChar char="à"/>
-            </a:pPr>
-            <a:endParaRPr lang="en-US" dirty="0"/>
-          </a:p>
-        </p:txBody>
-      </p:sp>
-    </p:spTree>
-    <p:extLst>
-      <p:ext uri="{BB962C8B-B14F-4D97-AF65-F5344CB8AC3E}">
-        <p14:creationId xmlns:p14="http://schemas.microsoft.com/office/powerpoint/2010/main" val="3479139215"/>
-      </p:ext>
-    </p:extLst>
-  </p:cSld>
-  <p:clrMapOvr>
-    <a:masterClrMapping/>
-  </p:clrMapOvr>
-</p:sld>
-</file>
-
-<file path=ppt/slides/slide20.xml><?xml version="1.0" encoding="utf-8"?>
+<file path=ppt/slides/slide19.xml><?xml version="1.0" encoding="utf-8"?>
 <p:sld xmlns:a="http://schemas.openxmlformats.org/drawingml/2006/main" xmlns:r="http://schemas.openxmlformats.org/officeDocument/2006/relationships" xmlns:p="http://schemas.openxmlformats.org/presentationml/2006/main">
   <p:cSld>
     <p:spTree>
@@ -15890,7 +12569,172 @@
 </p:sld>
 </file>
 
-<file path=ppt/slides/slide21.xml><?xml version="1.0" encoding="utf-8"?>
+<file path=ppt/slides/slide2.xml><?xml version="1.0" encoding="utf-8"?>
+<p:sld xmlns:a="http://schemas.openxmlformats.org/drawingml/2006/main" xmlns:r="http://schemas.openxmlformats.org/officeDocument/2006/relationships" xmlns:p="http://schemas.openxmlformats.org/presentationml/2006/main">
+  <p:cSld>
+    <p:spTree>
+      <p:nvGrpSpPr>
+        <p:cNvPr id="1" name=""/>
+        <p:cNvGrpSpPr/>
+        <p:nvPr/>
+      </p:nvGrpSpPr>
+      <p:grpSpPr>
+        <a:xfrm>
+          <a:off x="0" y="0"/>
+          <a:ext cx="0" cy="0"/>
+          <a:chOff x="0" y="0"/>
+          <a:chExt cx="0" cy="0"/>
+        </a:xfrm>
+      </p:grpSpPr>
+      <p:sp>
+        <p:nvSpPr>
+          <p:cNvPr id="2" name="Titel 1">
+            <a:extLst>
+              <a:ext uri="{FF2B5EF4-FFF2-40B4-BE49-F238E27FC236}">
+                <a16:creationId xmlns:a16="http://schemas.microsoft.com/office/drawing/2014/main" id="{EF0A671E-3F0C-E208-A30F-3531121F5CAB}"/>
+              </a:ext>
+            </a:extLst>
+          </p:cNvPr>
+          <p:cNvSpPr>
+            <a:spLocks noGrp="1"/>
+          </p:cNvSpPr>
+          <p:nvPr>
+            <p:ph type="title"/>
+          </p:nvPr>
+        </p:nvSpPr>
+        <p:spPr/>
+        <p:txBody>
+          <a:bodyPr/>
+          <a:lstStyle/>
+          <a:p>
+            <a:r>
+              <a:rPr lang="de-DE" dirty="0"/>
+              <a:t>Business Understanding – Problem</a:t>
+            </a:r>
+            <a:endParaRPr lang="en-US" dirty="0"/>
+          </a:p>
+        </p:txBody>
+      </p:sp>
+      <p:sp>
+        <p:nvSpPr>
+          <p:cNvPr id="3" name="Inhaltsplatzhalter 2">
+            <a:extLst>
+              <a:ext uri="{FF2B5EF4-FFF2-40B4-BE49-F238E27FC236}">
+                <a16:creationId xmlns:a16="http://schemas.microsoft.com/office/drawing/2014/main" id="{FB693121-058C-0414-6A28-F2AF176FF0F7}"/>
+              </a:ext>
+            </a:extLst>
+          </p:cNvPr>
+          <p:cNvSpPr>
+            <a:spLocks noGrp="1"/>
+          </p:cNvSpPr>
+          <p:nvPr>
+            <p:ph idx="1"/>
+          </p:nvPr>
+        </p:nvSpPr>
+        <p:spPr/>
+        <p:txBody>
+          <a:bodyPr>
+            <a:normAutofit/>
+          </a:bodyPr>
+          <a:lstStyle/>
+          <a:p>
+            <a:pPr>
+              <a:buFont typeface="Wingdings" panose="05000000000000000000" pitchFamily="2" charset="2"/>
+              <a:buChar char="à"/>
+            </a:pPr>
+            <a:r>
+              <a:rPr lang="de-DE" dirty="0">
+                <a:sym typeface="Wingdings" panose="05000000000000000000" pitchFamily="2" charset="2"/>
+              </a:rPr>
+              <a:t>Auftraggeber ist ein Unternehmen, welches Raketen herstellt</a:t>
+            </a:r>
+          </a:p>
+          <a:p>
+            <a:pPr marL="0" indent="0">
+              <a:buNone/>
+            </a:pPr>
+            <a:endParaRPr lang="de-DE" dirty="0">
+              <a:sym typeface="Wingdings" panose="05000000000000000000" pitchFamily="2" charset="2"/>
+            </a:endParaRPr>
+          </a:p>
+          <a:p>
+            <a:pPr marL="0" indent="0">
+              <a:buNone/>
+            </a:pPr>
+            <a:r>
+              <a:rPr lang="de-DE" dirty="0">
+                <a:sym typeface="Wingdings" panose="05000000000000000000" pitchFamily="2" charset="2"/>
+              </a:rPr>
+              <a:t>Problem:</a:t>
+            </a:r>
+          </a:p>
+          <a:p>
+            <a:pPr marL="0" indent="0">
+              <a:buNone/>
+            </a:pPr>
+            <a:r>
+              <a:rPr lang="de-DE" dirty="0">
+                <a:sym typeface="Wingdings" panose="05000000000000000000" pitchFamily="2" charset="2"/>
+              </a:rPr>
+              <a:t>Häufige unvorhergesehene Produktionsausfälle</a:t>
+            </a:r>
+          </a:p>
+          <a:p>
+            <a:pPr marL="0" indent="0">
+              <a:buNone/>
+            </a:pPr>
+            <a:r>
+              <a:rPr lang="de-DE" dirty="0">
+                <a:sym typeface="Wingdings" panose="05000000000000000000" pitchFamily="2" charset="2"/>
+              </a:rPr>
+              <a:t>- Produktion verzögert sich</a:t>
+            </a:r>
+          </a:p>
+          <a:p>
+            <a:pPr marL="0" indent="0">
+              <a:buNone/>
+            </a:pPr>
+            <a:r>
+              <a:rPr lang="de-DE" dirty="0">
+                <a:sym typeface="Wingdings" panose="05000000000000000000" pitchFamily="2" charset="2"/>
+              </a:rPr>
+              <a:t>- Hohe Kosten entstehen</a:t>
+            </a:r>
+          </a:p>
+          <a:p>
+            <a:pPr marL="0" indent="0">
+              <a:buNone/>
+            </a:pPr>
+            <a:r>
+              <a:rPr lang="de-DE" dirty="0">
+                <a:sym typeface="Wingdings" panose="05000000000000000000" pitchFamily="2" charset="2"/>
+              </a:rPr>
+              <a:t>Kundenzufriedenheit ist durch die Produktionsausfälle gesunken</a:t>
+            </a:r>
+          </a:p>
+          <a:p>
+            <a:pPr>
+              <a:buFont typeface="Wingdings" panose="05000000000000000000" pitchFamily="2" charset="2"/>
+              <a:buChar char="à"/>
+            </a:pPr>
+            <a:endParaRPr lang="en-US" dirty="0"/>
+          </a:p>
+        </p:txBody>
+      </p:sp>
+    </p:spTree>
+    <p:extLst>
+      <p:ext uri="{BB962C8B-B14F-4D97-AF65-F5344CB8AC3E}">
+        <p14:creationId xmlns:p14="http://schemas.microsoft.com/office/powerpoint/2010/main" val="3479139215"/>
+      </p:ext>
+    </p:extLst>
+  </p:cSld>
+  <p:clrMapOvr>
+    <a:masterClrMapping/>
+  </p:clrMapOvr>
+</p:sld>
+</file>
+
+<file path=ppt/slides/slide20.xml><?xml version="1.0" encoding="utf-8"?>
 <p:sld xmlns:a="http://schemas.openxmlformats.org/drawingml/2006/main" xmlns:r="http://schemas.openxmlformats.org/officeDocument/2006/relationships" xmlns:p="http://schemas.openxmlformats.org/presentationml/2006/main">
   <p:cSld>
     <p:spTree>
@@ -15981,7 +12825,7 @@
 </p:sld>
 </file>
 
-<file path=ppt/slides/slide22.xml><?xml version="1.0" encoding="utf-8"?>
+<file path=ppt/slides/slide21.xml><?xml version="1.0" encoding="utf-8"?>
 <p:sld xmlns:a="http://schemas.openxmlformats.org/drawingml/2006/main" xmlns:r="http://schemas.openxmlformats.org/officeDocument/2006/relationships" xmlns:p="http://schemas.openxmlformats.org/presentationml/2006/main">
   <p:cSld>
     <p:spTree>
@@ -16216,7 +13060,7 @@
 </p:sld>
 </file>
 
-<file path=ppt/slides/slide23.xml><?xml version="1.0" encoding="utf-8"?>
+<file path=ppt/slides/slide22.xml><?xml version="1.0" encoding="utf-8"?>
 <p:sld xmlns:a="http://schemas.openxmlformats.org/drawingml/2006/main" xmlns:r="http://schemas.openxmlformats.org/officeDocument/2006/relationships" xmlns:p="http://schemas.openxmlformats.org/presentationml/2006/main">
   <p:cSld>
     <p:spTree>
@@ -16457,7 +13301,7 @@
 </p:sld>
 </file>
 
-<file path=ppt/slides/slide24.xml><?xml version="1.0" encoding="utf-8"?>
+<file path=ppt/slides/slide23.xml><?xml version="1.0" encoding="utf-8"?>
 <p:sld xmlns:a="http://schemas.openxmlformats.org/drawingml/2006/main" xmlns:r="http://schemas.openxmlformats.org/officeDocument/2006/relationships" xmlns:p="http://schemas.openxmlformats.org/presentationml/2006/main">
   <p:cSld>
     <p:spTree>
@@ -16574,7 +13418,7 @@
 </p:sld>
 </file>
 
-<file path=ppt/slides/slide25.xml><?xml version="1.0" encoding="utf-8"?>
+<file path=ppt/slides/slide24.xml><?xml version="1.0" encoding="utf-8"?>
 <p:sld xmlns:a="http://schemas.openxmlformats.org/drawingml/2006/main" xmlns:r="http://schemas.openxmlformats.org/officeDocument/2006/relationships" xmlns:p="http://schemas.openxmlformats.org/presentationml/2006/main">
   <p:cSld>
     <p:spTree>
@@ -16658,7 +13502,7 @@
 </p:sld>
 </file>
 
-<file path=ppt/slides/slide26.xml><?xml version="1.0" encoding="utf-8"?>
+<file path=ppt/slides/slide25.xml><?xml version="1.0" encoding="utf-8"?>
 <p:sld xmlns:a="http://schemas.openxmlformats.org/drawingml/2006/main" xmlns:r="http://schemas.openxmlformats.org/officeDocument/2006/relationships" xmlns:p="http://schemas.openxmlformats.org/presentationml/2006/main">
   <p:cSld>
     <p:spTree>
@@ -16813,7 +13657,7 @@
         <p:spPr/>
         <p:txBody>
           <a:bodyPr>
-            <a:normAutofit lnSpcReduction="10000"/>
+            <a:normAutofit fontScale="92500" lnSpcReduction="20000"/>
           </a:bodyPr>
           <a:lstStyle/>
           <a:p>
@@ -16825,7 +13669,7 @@
               <a:rPr lang="de-DE" dirty="0">
                 <a:sym typeface="Wingdings" panose="05000000000000000000" pitchFamily="2" charset="2"/>
               </a:rPr>
-              <a:t>Die Maschinen geben während ihres Betriebs Statusmeldungen ab</a:t>
+              <a:t>Die Maschinen geben während ihres Betriebs Statusmeldungen ab, welche in Log Files gespeichert werden. Zudem wird alle 5 Minuten der Zustand der Maschine übermittelt. Unteranderem Sensordaten</a:t>
             </a:r>
           </a:p>
           <a:p>
@@ -17038,106 +13882,6 @@
   <p:cSld>
     <p:spTree>
       <p:nvGrpSpPr>
-        <p:cNvPr id="1" name="">
-          <a:extLst>
-            <a:ext uri="{FF2B5EF4-FFF2-40B4-BE49-F238E27FC236}">
-              <a16:creationId xmlns:a16="http://schemas.microsoft.com/office/drawing/2014/main" id="{775E2F6D-ED3F-3C4A-5FAD-1369EAFB1F92}"/>
-            </a:ext>
-          </a:extLst>
-        </p:cNvPr>
-        <p:cNvGrpSpPr/>
-        <p:nvPr/>
-      </p:nvGrpSpPr>
-      <p:grpSpPr>
-        <a:xfrm>
-          <a:off x="0" y="0"/>
-          <a:ext cx="0" cy="0"/>
-          <a:chOff x="0" y="0"/>
-          <a:chExt cx="0" cy="0"/>
-        </a:xfrm>
-      </p:grpSpPr>
-      <p:graphicFrame>
-        <p:nvGraphicFramePr>
-          <p:cNvPr id="7" name="Inhaltsplatzhalter 2">
-            <a:extLst>
-              <a:ext uri="{FF2B5EF4-FFF2-40B4-BE49-F238E27FC236}">
-                <a16:creationId xmlns:a16="http://schemas.microsoft.com/office/drawing/2014/main" id="{F48F296B-68D5-1188-1C23-3BBAD0B30934}"/>
-              </a:ext>
-            </a:extLst>
-          </p:cNvPr>
-          <p:cNvGraphicFramePr>
-            <a:graphicFrameLocks noGrp="1"/>
-          </p:cNvGraphicFramePr>
-          <p:nvPr>
-            <p:ph idx="1"/>
-            <p:extLst>
-              <p:ext uri="{D42A27DB-BD31-4B8C-83A1-F6EECF244321}">
-                <p14:modId xmlns:p14="http://schemas.microsoft.com/office/powerpoint/2010/main" val="2897188105"/>
-              </p:ext>
-            </p:extLst>
-          </p:nvPr>
-        </p:nvGraphicFramePr>
-        <p:xfrm>
-          <a:off x="838200" y="1825625"/>
-          <a:ext cx="10515600" cy="3106593"/>
-        </p:xfrm>
-        <a:graphic>
-          <a:graphicData uri="http://schemas.openxmlformats.org/drawingml/2006/diagram">
-            <dgm:relIds xmlns:dgm="http://schemas.openxmlformats.org/drawingml/2006/diagram" xmlns:r="http://schemas.openxmlformats.org/officeDocument/2006/relationships" r:dm="rId2" r:lo="rId3" r:qs="rId4" r:cs="rId5"/>
-          </a:graphicData>
-        </a:graphic>
-      </p:graphicFrame>
-      <p:sp>
-        <p:nvSpPr>
-          <p:cNvPr id="2" name="Titel 1">
-            <a:extLst>
-              <a:ext uri="{FF2B5EF4-FFF2-40B4-BE49-F238E27FC236}">
-                <a16:creationId xmlns:a16="http://schemas.microsoft.com/office/drawing/2014/main" id="{E19A55E7-A7CE-FA2A-901A-2F2036F352E3}"/>
-              </a:ext>
-            </a:extLst>
-          </p:cNvPr>
-          <p:cNvSpPr>
-            <a:spLocks noGrp="1"/>
-          </p:cNvSpPr>
-          <p:nvPr>
-            <p:ph type="title"/>
-          </p:nvPr>
-        </p:nvSpPr>
-        <p:spPr/>
-        <p:txBody>
-          <a:bodyPr/>
-          <a:lstStyle/>
-          <a:p>
-            <a:r>
-              <a:rPr lang="de-DE" dirty="0"/>
-              <a:t>Strukturierte Daten – </a:t>
-            </a:r>
-            <a:r>
-              <a:rPr lang="de-DE" dirty="0" err="1"/>
-              <a:t>Preparation</a:t>
-            </a:r>
-            <a:endParaRPr lang="en-US" dirty="0"/>
-          </a:p>
-        </p:txBody>
-      </p:sp>
-    </p:spTree>
-    <p:extLst>
-      <p:ext uri="{BB962C8B-B14F-4D97-AF65-F5344CB8AC3E}">
-        <p14:creationId xmlns:p14="http://schemas.microsoft.com/office/powerpoint/2010/main" val="1746363379"/>
-      </p:ext>
-    </p:extLst>
-  </p:cSld>
-  <p:clrMapOvr>
-    <a:masterClrMapping/>
-  </p:clrMapOvr>
-</p:sld>
-</file>
-
-<file path=ppt/slides/slide6.xml><?xml version="1.0" encoding="utf-8"?>
-<p:sld xmlns:a="http://schemas.openxmlformats.org/drawingml/2006/main" xmlns:r="http://schemas.openxmlformats.org/officeDocument/2006/relationships" xmlns:p="http://schemas.openxmlformats.org/presentationml/2006/main">
-  <p:cSld>
-    <p:spTree>
-      <p:nvGrpSpPr>
         <p:cNvPr id="1" name=""/>
         <p:cNvGrpSpPr/>
         <p:nvPr/>
@@ -17173,7 +13917,7 @@
           <a:p>
             <a:r>
               <a:rPr lang="de-DE" dirty="0"/>
-              <a:t>Data Understanding – Sensor Daten</a:t>
+              <a:t>Data Understanding – Strukturierte Daten</a:t>
             </a:r>
             <a:endParaRPr lang="en-US" dirty="0"/>
           </a:p>
@@ -17198,7 +13942,7 @@
         <p:spPr/>
         <p:txBody>
           <a:bodyPr>
-            <a:normAutofit fontScale="92500" lnSpcReduction="20000"/>
+            <a:normAutofit fontScale="77500" lnSpcReduction="20000"/>
           </a:bodyPr>
           <a:lstStyle/>
           <a:p>
@@ -17336,7 +14080,13 @@
           <a:p>
             <a:r>
               <a:rPr lang="de-DE" dirty="0"/>
-              <a:t>Fallen alle Sensoren aus, ist von einem Ausfall der Maschine auszugehen</a:t>
+              <a:t>Wenn alle Sensoren keinen Wert liefern, ist die Maschine ausgefallen</a:t>
+            </a:r>
+          </a:p>
+          <a:p>
+            <a:r>
+              <a:rPr lang="de-DE" dirty="0"/>
+              <a:t>Man müsste einen vorhersagen können, wann eine Maschine ausfällt, im Grunde bei welchem Sensorwert in den nächsten 5 Minuten die Maschine ausfällt</a:t>
             </a:r>
             <a:endParaRPr lang="en-US" dirty="0"/>
           </a:p>
@@ -17355,7 +14105,7 @@
 </p:sld>
 </file>
 
-<file path=ppt/slides/slide7.xml><?xml version="1.0" encoding="utf-8"?>
+<file path=ppt/slides/slide6.xml><?xml version="1.0" encoding="utf-8"?>
 <p:sld xmlns:a="http://schemas.openxmlformats.org/drawingml/2006/main" xmlns:r="http://schemas.openxmlformats.org/officeDocument/2006/relationships" xmlns:p="http://schemas.openxmlformats.org/presentationml/2006/main">
   <p:cSld>
     <p:spTree>
@@ -17395,7 +14145,7 @@
           <a:p>
             <a:r>
               <a:rPr lang="de-DE" dirty="0"/>
-              <a:t>Data Understanding – Log Daten	</a:t>
+              <a:t>Data Understanding – Unstrukturierte Daten	</a:t>
             </a:r>
             <a:endParaRPr lang="en-US" dirty="0"/>
           </a:p>
@@ -17824,7 +14574,7 @@
 </p:sld>
 </file>
 
-<file path=ppt/slides/slide8.xml><?xml version="1.0" encoding="utf-8"?>
+<file path=ppt/slides/slide7.xml><?xml version="1.0" encoding="utf-8"?>
 <p:sld xmlns:a="http://schemas.openxmlformats.org/drawingml/2006/main" xmlns:r="http://schemas.openxmlformats.org/officeDocument/2006/relationships" xmlns:p="http://schemas.openxmlformats.org/presentationml/2006/main">
   <p:cSld>
     <p:spTree>
@@ -17939,7 +14689,7 @@
 </p:sld>
 </file>
 
-<file path=ppt/slides/slide9.xml><?xml version="1.0" encoding="utf-8"?>
+<file path=ppt/slides/slide8.xml><?xml version="1.0" encoding="utf-8"?>
 <p:sld xmlns:a="http://schemas.openxmlformats.org/drawingml/2006/main" xmlns:r="http://schemas.openxmlformats.org/officeDocument/2006/relationships" xmlns:p="http://schemas.openxmlformats.org/presentationml/2006/main">
   <p:cSld>
     <p:spTree>
@@ -18030,6 +14780,178 @@
     <p:extLst>
       <p:ext uri="{BB962C8B-B14F-4D97-AF65-F5344CB8AC3E}">
         <p14:creationId xmlns:p14="http://schemas.microsoft.com/office/powerpoint/2010/main" val="2764976056"/>
+      </p:ext>
+    </p:extLst>
+  </p:cSld>
+  <p:clrMapOvr>
+    <a:masterClrMapping/>
+  </p:clrMapOvr>
+</p:sld>
+</file>
+
+<file path=ppt/slides/slide9.xml><?xml version="1.0" encoding="utf-8"?>
+<p:sld xmlns:a="http://schemas.openxmlformats.org/drawingml/2006/main" xmlns:r="http://schemas.openxmlformats.org/officeDocument/2006/relationships" xmlns:p="http://schemas.openxmlformats.org/presentationml/2006/main">
+  <p:cSld>
+    <p:spTree>
+      <p:nvGrpSpPr>
+        <p:cNvPr id="1" name=""/>
+        <p:cNvGrpSpPr/>
+        <p:nvPr/>
+      </p:nvGrpSpPr>
+      <p:grpSpPr>
+        <a:xfrm>
+          <a:off x="0" y="0"/>
+          <a:ext cx="0" cy="0"/>
+          <a:chOff x="0" y="0"/>
+          <a:chExt cx="0" cy="0"/>
+        </a:xfrm>
+      </p:grpSpPr>
+      <p:sp>
+        <p:nvSpPr>
+          <p:cNvPr id="2" name="Titel 1">
+            <a:extLst>
+              <a:ext uri="{FF2B5EF4-FFF2-40B4-BE49-F238E27FC236}">
+                <a16:creationId xmlns:a16="http://schemas.microsoft.com/office/drawing/2014/main" id="{3D12C5CA-E520-8343-6B63-F98E42E089BC}"/>
+              </a:ext>
+            </a:extLst>
+          </p:cNvPr>
+          <p:cNvSpPr>
+            <a:spLocks noGrp="1"/>
+          </p:cNvSpPr>
+          <p:nvPr>
+            <p:ph type="title"/>
+          </p:nvPr>
+        </p:nvSpPr>
+        <p:spPr/>
+        <p:txBody>
+          <a:bodyPr/>
+          <a:lstStyle/>
+          <a:p>
+            <a:r>
+              <a:rPr lang="de-DE" dirty="0"/>
+              <a:t>Strukturierte Daten – Zugriffverfahren</a:t>
+            </a:r>
+            <a:endParaRPr lang="en-US" dirty="0"/>
+          </a:p>
+        </p:txBody>
+      </p:sp>
+      <p:sp>
+        <p:nvSpPr>
+          <p:cNvPr id="3" name="Inhaltsplatzhalter 2">
+            <a:extLst>
+              <a:ext uri="{FF2B5EF4-FFF2-40B4-BE49-F238E27FC236}">
+                <a16:creationId xmlns:a16="http://schemas.microsoft.com/office/drawing/2014/main" id="{B42A4488-4288-36D2-8D40-F4E607B2120E}"/>
+              </a:ext>
+            </a:extLst>
+          </p:cNvPr>
+          <p:cNvSpPr>
+            <a:spLocks noGrp="1"/>
+          </p:cNvSpPr>
+          <p:nvPr>
+            <p:ph idx="1"/>
+          </p:nvPr>
+        </p:nvSpPr>
+        <p:spPr/>
+        <p:txBody>
+          <a:bodyPr/>
+          <a:lstStyle/>
+          <a:p>
+            <a:r>
+              <a:rPr lang="de-DE" dirty="0"/>
+              <a:t>Da die Log Daten strukturiert sind, werden diese in einer relationalen Datenbank gespeichert</a:t>
+            </a:r>
+          </a:p>
+          <a:p>
+            <a:r>
+              <a:rPr lang="de-DE" dirty="0"/>
+              <a:t>Aufgrund der angegebenen Kundenwünsche wurde ein SQL Server für die Datenbank genutzt</a:t>
+            </a:r>
+          </a:p>
+          <a:p>
+            <a:r>
+              <a:rPr lang="de-DE" dirty="0"/>
+              <a:t>Zugriff erfolgt über einen Datenbankzugriff</a:t>
+            </a:r>
+          </a:p>
+          <a:p>
+            <a:r>
+              <a:rPr lang="de-DE" dirty="0"/>
+              <a:t>CSV wurde importiert und dann direkt ins richtige				Format überführt</a:t>
+            </a:r>
+            <a:endParaRPr lang="en-US" dirty="0"/>
+          </a:p>
+        </p:txBody>
+      </p:sp>
+      <p:pic>
+        <p:nvPicPr>
+          <p:cNvPr id="6" name="Grafik 5">
+            <a:extLst>
+              <a:ext uri="{FF2B5EF4-FFF2-40B4-BE49-F238E27FC236}">
+                <a16:creationId xmlns:a16="http://schemas.microsoft.com/office/drawing/2014/main" id="{9B934F3E-7A72-9A30-5895-6E42CEB3C080}"/>
+              </a:ext>
+            </a:extLst>
+          </p:cNvPr>
+          <p:cNvPicPr>
+            <a:picLocks noChangeAspect="1"/>
+          </p:cNvPicPr>
+          <p:nvPr/>
+        </p:nvPicPr>
+        <p:blipFill>
+          <a:blip r:embed="rId2"/>
+          <a:stretch>
+            <a:fillRect/>
+          </a:stretch>
+        </p:blipFill>
+        <p:spPr>
+          <a:xfrm>
+            <a:off x="9156598" y="3808041"/>
+            <a:ext cx="3035402" cy="2684834"/>
+          </a:xfrm>
+          <a:prstGeom prst="rect">
+            <a:avLst/>
+          </a:prstGeom>
+        </p:spPr>
+      </p:pic>
+      <p:pic>
+        <p:nvPicPr>
+          <p:cNvPr id="10" name="Grafik 9" descr="Ein Bild, das Text, Schrift, Screenshot, Reihe enthält.&#10;&#10;Automatisch generierte Beschreibung">
+            <a:extLst>
+              <a:ext uri="{FF2B5EF4-FFF2-40B4-BE49-F238E27FC236}">
+                <a16:creationId xmlns:a16="http://schemas.microsoft.com/office/drawing/2014/main" id="{2B7AA795-6BE3-8AC3-E8AC-54767CD25FAB}"/>
+              </a:ext>
+            </a:extLst>
+          </p:cNvPr>
+          <p:cNvPicPr>
+            <a:picLocks noChangeAspect="1"/>
+          </p:cNvPicPr>
+          <p:nvPr/>
+        </p:nvPicPr>
+        <p:blipFill>
+          <a:blip r:embed="rId3">
+            <a:extLst>
+              <a:ext uri="{28A0092B-C50C-407E-A947-70E740481C1C}">
+                <a14:useLocalDpi xmlns:a14="http://schemas.microsoft.com/office/drawing/2010/main" val="0"/>
+              </a:ext>
+            </a:extLst>
+          </a:blip>
+          <a:stretch>
+            <a:fillRect/>
+          </a:stretch>
+        </p:blipFill>
+        <p:spPr>
+          <a:xfrm>
+            <a:off x="1003570" y="5150458"/>
+            <a:ext cx="3610479" cy="628738"/>
+          </a:xfrm>
+          <a:prstGeom prst="rect">
+            <a:avLst/>
+          </a:prstGeom>
+        </p:spPr>
+      </p:pic>
+    </p:spTree>
+    <p:extLst>
+      <p:ext uri="{BB962C8B-B14F-4D97-AF65-F5344CB8AC3E}">
+        <p14:creationId xmlns:p14="http://schemas.microsoft.com/office/powerpoint/2010/main" val="2018274000"/>
       </p:ext>
     </p:extLst>
   </p:cSld>

</xml_diff>